<commit_message>
Atualização Apresentação Fundamentos da Gestão
</commit_message>
<xml_diff>
--- a/Docs/Apresentação ANS Sistemas (Fundamentos da Gestao).pptx
+++ b/Docs/Apresentação ANS Sistemas (Fundamentos da Gestao).pptx
@@ -7,11 +7,11 @@
   <p:sldIdLst>
     <p:sldId id="256" r:id="rId2"/>
     <p:sldId id="257" r:id="rId3"/>
-    <p:sldId id="277" r:id="rId4"/>
+    <p:sldId id="318" r:id="rId4"/>
     <p:sldId id="271" r:id="rId5"/>
-    <p:sldId id="299" r:id="rId6"/>
-    <p:sldId id="315" r:id="rId7"/>
-    <p:sldId id="300" r:id="rId8"/>
+    <p:sldId id="320" r:id="rId6"/>
+    <p:sldId id="321" r:id="rId7"/>
+    <p:sldId id="319" r:id="rId8"/>
     <p:sldId id="316" r:id="rId9"/>
     <p:sldId id="306" r:id="rId10"/>
     <p:sldId id="311" r:id="rId11"/>
@@ -129,7 +129,7 @@
   </p:defaultTextStyle>
   <p:extLst>
     <p:ext uri="{EFAFB233-063F-42B5-8137-9DF3F51BA10A}">
-      <p15:sldGuideLst xmlns:p15="http://schemas.microsoft.com/office/powerpoint/2012/main">
+      <p15:sldGuideLst xmlns:p15="http://schemas.microsoft.com/office/powerpoint/2012/main" xmlns="">
         <p15:guide id="1" orient="horz" pos="2160">
           <p15:clr>
             <a:srgbClr val="A4A3A4"/>
@@ -283,7 +283,7 @@
           <a:p>
             <a:fld id="{8EE831F1-ED05-4BAA-8C74-2BAAB7F343BB}" type="datetimeFigureOut">
               <a:rPr lang="pt-BR" smtClean="0"/>
-              <a:t>16/06/2017</a:t>
+              <a:t>17/06/2017</a:t>
             </a:fld>
             <a:endParaRPr lang="pt-BR"/>
           </a:p>
@@ -325,7 +325,7 @@
           <a:p>
             <a:fld id="{EF5993D9-3239-4E1A-B177-3A3DADB6A390}" type="slidenum">
               <a:rPr lang="pt-BR" smtClean="0"/>
-              <a:t>‹nº›</a:t>
+              <a:t>‹#›</a:t>
             </a:fld>
             <a:endParaRPr lang="pt-BR"/>
           </a:p>
@@ -570,7 +570,7 @@
           <a:p>
             <a:fld id="{8EE831F1-ED05-4BAA-8C74-2BAAB7F343BB}" type="datetimeFigureOut">
               <a:rPr lang="pt-BR" smtClean="0"/>
-              <a:t>16/06/2017</a:t>
+              <a:t>17/06/2017</a:t>
             </a:fld>
             <a:endParaRPr lang="pt-BR"/>
           </a:p>
@@ -612,7 +612,7 @@
           <a:p>
             <a:fld id="{EF5993D9-3239-4E1A-B177-3A3DADB6A390}" type="slidenum">
               <a:rPr lang="pt-BR" smtClean="0"/>
-              <a:t>‹nº›</a:t>
+              <a:t>‹#›</a:t>
             </a:fld>
             <a:endParaRPr lang="pt-BR"/>
           </a:p>
@@ -762,7 +762,7 @@
           <a:p>
             <a:fld id="{8EE831F1-ED05-4BAA-8C74-2BAAB7F343BB}" type="datetimeFigureOut">
               <a:rPr lang="pt-BR" smtClean="0"/>
-              <a:t>16/06/2017</a:t>
+              <a:t>17/06/2017</a:t>
             </a:fld>
             <a:endParaRPr lang="pt-BR"/>
           </a:p>
@@ -804,7 +804,7 @@
           <a:p>
             <a:fld id="{EF5993D9-3239-4E1A-B177-3A3DADB6A390}" type="slidenum">
               <a:rPr lang="pt-BR" smtClean="0"/>
-              <a:t>‹nº›</a:t>
+              <a:t>‹#›</a:t>
             </a:fld>
             <a:endParaRPr lang="pt-BR"/>
           </a:p>
@@ -1023,7 +1023,7 @@
           <a:p>
             <a:fld id="{8EE831F1-ED05-4BAA-8C74-2BAAB7F343BB}" type="datetimeFigureOut">
               <a:rPr lang="pt-BR" smtClean="0"/>
-              <a:t>16/06/2017</a:t>
+              <a:t>17/06/2017</a:t>
             </a:fld>
             <a:endParaRPr lang="pt-BR"/>
           </a:p>
@@ -1065,7 +1065,7 @@
           <a:p>
             <a:fld id="{EF5993D9-3239-4E1A-B177-3A3DADB6A390}" type="slidenum">
               <a:rPr lang="pt-BR" smtClean="0"/>
-              <a:t>‹nº›</a:t>
+              <a:t>‹#›</a:t>
             </a:fld>
             <a:endParaRPr lang="pt-BR"/>
           </a:p>
@@ -1447,7 +1447,7 @@
           <a:p>
             <a:fld id="{8EE831F1-ED05-4BAA-8C74-2BAAB7F343BB}" type="datetimeFigureOut">
               <a:rPr lang="pt-BR" smtClean="0"/>
-              <a:t>16/06/2017</a:t>
+              <a:t>17/06/2017</a:t>
             </a:fld>
             <a:endParaRPr lang="pt-BR"/>
           </a:p>
@@ -1489,7 +1489,7 @@
           <a:p>
             <a:fld id="{EF5993D9-3239-4E1A-B177-3A3DADB6A390}" type="slidenum">
               <a:rPr lang="pt-BR" smtClean="0"/>
-              <a:t>‹nº›</a:t>
+              <a:t>‹#›</a:t>
             </a:fld>
             <a:endParaRPr lang="pt-BR"/>
           </a:p>
@@ -1993,7 +1993,7 @@
           <a:p>
             <a:fld id="{8EE831F1-ED05-4BAA-8C74-2BAAB7F343BB}" type="datetimeFigureOut">
               <a:rPr lang="pt-BR" smtClean="0"/>
-              <a:t>16/06/2017</a:t>
+              <a:t>17/06/2017</a:t>
             </a:fld>
             <a:endParaRPr lang="pt-BR"/>
           </a:p>
@@ -2035,7 +2035,7 @@
           <a:p>
             <a:fld id="{EF5993D9-3239-4E1A-B177-3A3DADB6A390}" type="slidenum">
               <a:rPr lang="pt-BR" smtClean="0"/>
-              <a:t>‹nº›</a:t>
+              <a:t>‹#›</a:t>
             </a:fld>
             <a:endParaRPr lang="pt-BR"/>
           </a:p>
@@ -2833,7 +2833,7 @@
           <a:p>
             <a:fld id="{8EE831F1-ED05-4BAA-8C74-2BAAB7F343BB}" type="datetimeFigureOut">
               <a:rPr lang="pt-BR" smtClean="0"/>
-              <a:t>16/06/2017</a:t>
+              <a:t>17/06/2017</a:t>
             </a:fld>
             <a:endParaRPr lang="pt-BR"/>
           </a:p>
@@ -2875,7 +2875,7 @@
           <a:p>
             <a:fld id="{EF5993D9-3239-4E1A-B177-3A3DADB6A390}" type="slidenum">
               <a:rPr lang="pt-BR" smtClean="0"/>
-              <a:t>‹nº›</a:t>
+              <a:t>‹#›</a:t>
             </a:fld>
             <a:endParaRPr lang="pt-BR"/>
           </a:p>
@@ -3003,7 +3003,7 @@
           <a:p>
             <a:fld id="{8EE831F1-ED05-4BAA-8C74-2BAAB7F343BB}" type="datetimeFigureOut">
               <a:rPr lang="pt-BR" smtClean="0"/>
-              <a:t>16/06/2017</a:t>
+              <a:t>17/06/2017</a:t>
             </a:fld>
             <a:endParaRPr lang="pt-BR"/>
           </a:p>
@@ -3045,7 +3045,7 @@
           <a:p>
             <a:fld id="{EF5993D9-3239-4E1A-B177-3A3DADB6A390}" type="slidenum">
               <a:rPr lang="pt-BR" smtClean="0"/>
-              <a:t>‹nº›</a:t>
+              <a:t>‹#›</a:t>
             </a:fld>
             <a:endParaRPr lang="pt-BR"/>
           </a:p>
@@ -3187,7 +3187,7 @@
           <a:p>
             <a:fld id="{8EE831F1-ED05-4BAA-8C74-2BAAB7F343BB}" type="datetimeFigureOut">
               <a:rPr lang="pt-BR" smtClean="0"/>
-              <a:t>16/06/2017</a:t>
+              <a:t>17/06/2017</a:t>
             </a:fld>
             <a:endParaRPr lang="pt-BR"/>
           </a:p>
@@ -3229,7 +3229,7 @@
           <a:p>
             <a:fld id="{EF5993D9-3239-4E1A-B177-3A3DADB6A390}" type="slidenum">
               <a:rPr lang="pt-BR" smtClean="0"/>
-              <a:t>‹nº›</a:t>
+              <a:t>‹#›</a:t>
             </a:fld>
             <a:endParaRPr lang="pt-BR"/>
           </a:p>
@@ -3357,7 +3357,7 @@
           <a:p>
             <a:fld id="{8EE831F1-ED05-4BAA-8C74-2BAAB7F343BB}" type="datetimeFigureOut">
               <a:rPr lang="pt-BR" smtClean="0"/>
-              <a:t>16/06/2017</a:t>
+              <a:t>17/06/2017</a:t>
             </a:fld>
             <a:endParaRPr lang="pt-BR"/>
           </a:p>
@@ -3399,7 +3399,7 @@
           <a:p>
             <a:fld id="{EF5993D9-3239-4E1A-B177-3A3DADB6A390}" type="slidenum">
               <a:rPr lang="pt-BR" smtClean="0"/>
-              <a:t>‹nº›</a:t>
+              <a:t>‹#›</a:t>
             </a:fld>
             <a:endParaRPr lang="pt-BR"/>
           </a:p>
@@ -3605,7 +3605,7 @@
           <a:p>
             <a:fld id="{8EE831F1-ED05-4BAA-8C74-2BAAB7F343BB}" type="datetimeFigureOut">
               <a:rPr lang="pt-BR" smtClean="0"/>
-              <a:t>16/06/2017</a:t>
+              <a:t>17/06/2017</a:t>
             </a:fld>
             <a:endParaRPr lang="pt-BR"/>
           </a:p>
@@ -3647,7 +3647,7 @@
           <a:p>
             <a:fld id="{EF5993D9-3239-4E1A-B177-3A3DADB6A390}" type="slidenum">
               <a:rPr lang="pt-BR" smtClean="0"/>
-              <a:t>‹nº›</a:t>
+              <a:t>‹#›</a:t>
             </a:fld>
             <a:endParaRPr lang="pt-BR"/>
           </a:p>
@@ -3842,7 +3842,7 @@
           <a:p>
             <a:fld id="{8EE831F1-ED05-4BAA-8C74-2BAAB7F343BB}" type="datetimeFigureOut">
               <a:rPr lang="pt-BR" smtClean="0"/>
-              <a:t>16/06/2017</a:t>
+              <a:t>17/06/2017</a:t>
             </a:fld>
             <a:endParaRPr lang="pt-BR"/>
           </a:p>
@@ -3884,7 +3884,7 @@
           <a:p>
             <a:fld id="{EF5993D9-3239-4E1A-B177-3A3DADB6A390}" type="slidenum">
               <a:rPr lang="pt-BR" smtClean="0"/>
-              <a:t>‹nº›</a:t>
+              <a:t>‹#›</a:t>
             </a:fld>
             <a:endParaRPr lang="pt-BR"/>
           </a:p>
@@ -4215,7 +4215,7 @@
           <a:p>
             <a:fld id="{8EE831F1-ED05-4BAA-8C74-2BAAB7F343BB}" type="datetimeFigureOut">
               <a:rPr lang="pt-BR" smtClean="0"/>
-              <a:t>16/06/2017</a:t>
+              <a:t>17/06/2017</a:t>
             </a:fld>
             <a:endParaRPr lang="pt-BR"/>
           </a:p>
@@ -4257,7 +4257,7 @@
           <a:p>
             <a:fld id="{EF5993D9-3239-4E1A-B177-3A3DADB6A390}" type="slidenum">
               <a:rPr lang="pt-BR" smtClean="0"/>
-              <a:t>‹nº›</a:t>
+              <a:t>‹#›</a:t>
             </a:fld>
             <a:endParaRPr lang="pt-BR"/>
           </a:p>
@@ -4333,7 +4333,7 @@
           <a:p>
             <a:fld id="{8EE831F1-ED05-4BAA-8C74-2BAAB7F343BB}" type="datetimeFigureOut">
               <a:rPr lang="pt-BR" smtClean="0"/>
-              <a:t>16/06/2017</a:t>
+              <a:t>17/06/2017</a:t>
             </a:fld>
             <a:endParaRPr lang="pt-BR"/>
           </a:p>
@@ -4375,7 +4375,7 @@
           <a:p>
             <a:fld id="{EF5993D9-3239-4E1A-B177-3A3DADB6A390}" type="slidenum">
               <a:rPr lang="pt-BR" smtClean="0"/>
-              <a:t>‹nº›</a:t>
+              <a:t>‹#›</a:t>
             </a:fld>
             <a:endParaRPr lang="pt-BR"/>
           </a:p>
@@ -4428,7 +4428,7 @@
           <a:p>
             <a:fld id="{8EE831F1-ED05-4BAA-8C74-2BAAB7F343BB}" type="datetimeFigureOut">
               <a:rPr lang="pt-BR" smtClean="0"/>
-              <a:t>16/06/2017</a:t>
+              <a:t>17/06/2017</a:t>
             </a:fld>
             <a:endParaRPr lang="pt-BR"/>
           </a:p>
@@ -4470,7 +4470,7 @@
           <a:p>
             <a:fld id="{EF5993D9-3239-4E1A-B177-3A3DADB6A390}" type="slidenum">
               <a:rPr lang="pt-BR" smtClean="0"/>
-              <a:t>‹nº›</a:t>
+              <a:t>‹#›</a:t>
             </a:fld>
             <a:endParaRPr lang="pt-BR"/>
           </a:p>
@@ -4679,7 +4679,7 @@
           <a:p>
             <a:fld id="{8EE831F1-ED05-4BAA-8C74-2BAAB7F343BB}" type="datetimeFigureOut">
               <a:rPr lang="pt-BR" smtClean="0"/>
-              <a:t>16/06/2017</a:t>
+              <a:t>17/06/2017</a:t>
             </a:fld>
             <a:endParaRPr lang="pt-BR"/>
           </a:p>
@@ -4721,7 +4721,7 @@
           <a:p>
             <a:fld id="{EF5993D9-3239-4E1A-B177-3A3DADB6A390}" type="slidenum">
               <a:rPr lang="pt-BR" smtClean="0"/>
-              <a:t>‹nº›</a:t>
+              <a:t>‹#›</a:t>
             </a:fld>
             <a:endParaRPr lang="pt-BR"/>
           </a:p>
@@ -4966,7 +4966,7 @@
           <a:p>
             <a:fld id="{8EE831F1-ED05-4BAA-8C74-2BAAB7F343BB}" type="datetimeFigureOut">
               <a:rPr lang="pt-BR" smtClean="0"/>
-              <a:t>16/06/2017</a:t>
+              <a:t>17/06/2017</a:t>
             </a:fld>
             <a:endParaRPr lang="pt-BR"/>
           </a:p>
@@ -5008,7 +5008,7 @@
           <a:p>
             <a:fld id="{EF5993D9-3239-4E1A-B177-3A3DADB6A390}" type="slidenum">
               <a:rPr lang="pt-BR" smtClean="0"/>
-              <a:t>‹nº›</a:t>
+              <a:t>‹#›</a:t>
             </a:fld>
             <a:endParaRPr lang="pt-BR"/>
           </a:p>
@@ -5179,7 +5179,7 @@
           <a:p>
             <a:fld id="{8EE831F1-ED05-4BAA-8C74-2BAAB7F343BB}" type="datetimeFigureOut">
               <a:rPr lang="pt-BR" smtClean="0"/>
-              <a:t>16/06/2017</a:t>
+              <a:t>17/06/2017</a:t>
             </a:fld>
             <a:endParaRPr lang="pt-BR"/>
           </a:p>
@@ -5257,7 +5257,7 @@
           <a:p>
             <a:fld id="{EF5993D9-3239-4E1A-B177-3A3DADB6A390}" type="slidenum">
               <a:rPr lang="pt-BR" smtClean="0"/>
-              <a:t>‹nº›</a:t>
+              <a:t>‹#›</a:t>
             </a:fld>
             <a:endParaRPr lang="pt-BR"/>
           </a:p>
@@ -5672,8 +5672,8 @@
         </p:nvSpPr>
         <p:spPr>
           <a:xfrm>
-            <a:off x="323528" y="476672"/>
-            <a:ext cx="7772400" cy="1019199"/>
+            <a:off x="0" y="548680"/>
+            <a:ext cx="9144000" cy="1019199"/>
           </a:xfrm>
         </p:spPr>
         <p:txBody>
@@ -5700,8 +5700,8 @@
         </p:nvSpPr>
         <p:spPr>
           <a:xfrm>
-            <a:off x="1403648" y="3356992"/>
-            <a:ext cx="6400800" cy="1584176"/>
+            <a:off x="0" y="3140968"/>
+            <a:ext cx="9144000" cy="1584176"/>
           </a:xfrm>
         </p:spPr>
         <p:txBody>
@@ -5762,21 +5762,32 @@
           </a:p>
           <a:p>
             <a:r>
-              <a:rPr lang="pt-BR" b="1" dirty="0" err="1">
+              <a:rPr lang="pt-BR" b="1" dirty="0">
                 <a:solidFill>
                   <a:schemeClr val="tx1"/>
                 </a:solidFill>
               </a:rPr>
-              <a:t>Maikon</a:t>
-            </a:r>
-            <a:r>
-              <a:rPr lang="pt-BR" b="1" dirty="0">
+              <a:t>Maikon </a:t>
+            </a:r>
+            <a:r>
+              <a:rPr lang="pt-BR" b="1" dirty="0" smtClean="0">
                 <a:solidFill>
                   <a:schemeClr val="tx1"/>
                 </a:solidFill>
               </a:rPr>
-              <a:t> Silva</a:t>
-            </a:r>
+              <a:t>Silva</a:t>
+            </a:r>
+          </a:p>
+          <a:p>
+            <a:r>
+              <a:rPr lang="pt-BR" b="1" dirty="0" smtClean="0"/>
+              <a:t>Philipe Araújo</a:t>
+            </a:r>
+            <a:endParaRPr lang="pt-BR" b="1" dirty="0">
+              <a:solidFill>
+                <a:schemeClr val="tx1"/>
+              </a:solidFill>
+            </a:endParaRPr>
           </a:p>
           <a:p>
             <a:r>
@@ -5807,8 +5818,8 @@
         </p:nvSpPr>
         <p:spPr>
           <a:xfrm>
-            <a:off x="539552" y="1700808"/>
-            <a:ext cx="7772400" cy="1019199"/>
+            <a:off x="0" y="1700808"/>
+            <a:ext cx="9144000" cy="1080120"/>
           </a:xfrm>
           <a:prstGeom prst="rect">
             <a:avLst/>
@@ -6059,9 +6070,6 @@
               </a:rPr>
               <a:t>.</a:t>
             </a:r>
-            <a:endParaRPr lang="pt-BR" sz="2800" dirty="0">
-              <a:latin typeface="Arial" panose="020B0604020202020204" pitchFamily="34" charset="0"/>
-            </a:endParaRPr>
           </a:p>
         </p:txBody>
       </p:sp>
@@ -6178,12 +6186,7 @@
             <p:ph type="title"/>
           </p:nvPr>
         </p:nvSpPr>
-        <p:spPr>
-          <a:xfrm>
-            <a:off x="467544" y="116632"/>
-            <a:ext cx="8229600" cy="1600200"/>
-          </a:xfrm>
-        </p:spPr>
+        <p:spPr/>
         <p:txBody>
           <a:bodyPr/>
           <a:lstStyle/>
@@ -6197,6 +6200,49 @@
               <a:t>PÚBLICO-ALVO</a:t>
             </a:r>
             <a:endParaRPr lang="pt-BR" dirty="0"/>
+          </a:p>
+        </p:txBody>
+      </p:sp>
+      <p:sp>
+        <p:nvSpPr>
+          <p:cNvPr id="2" name="Content Placeholder 1"/>
+          <p:cNvSpPr>
+            <a:spLocks noGrp="1"/>
+          </p:cNvSpPr>
+          <p:nvPr>
+            <p:ph idx="1"/>
+          </p:nvPr>
+        </p:nvSpPr>
+        <p:spPr/>
+        <p:txBody>
+          <a:bodyPr/>
+          <a:lstStyle/>
+          <a:p>
+            <a:r>
+              <a:rPr lang="pt-BR" sz="2800" dirty="0" smtClean="0"/>
+              <a:t>Clínicas Médicas e Odontológicas;</a:t>
+            </a:r>
+          </a:p>
+          <a:p>
+            <a:r>
+              <a:rPr lang="pt-BR" sz="2800" dirty="0" smtClean="0"/>
+              <a:t>Operadoras de plano de saúde;</a:t>
+            </a:r>
+          </a:p>
+          <a:p>
+            <a:r>
+              <a:rPr lang="pt-BR" sz="2800" dirty="0" smtClean="0"/>
+              <a:t>Hospitais;</a:t>
+            </a:r>
+          </a:p>
+          <a:p>
+            <a:r>
+              <a:rPr lang="pt-BR" sz="2800" dirty="0" smtClean="0"/>
+              <a:t>Laboratórios;</a:t>
+            </a:r>
+          </a:p>
+          <a:p>
+            <a:endParaRPr lang="pt-BR" dirty="0" smtClean="0"/>
           </a:p>
         </p:txBody>
       </p:sp>
@@ -6404,7 +6450,6 @@
               <a:rPr lang="pt-BR" sz="2400" dirty="0"/>
               <a:t>Odontológicos e para profissionais autônomos da área de saúde.</a:t>
             </a:r>
-            <a:endParaRPr lang="pt-BR" sz="2400" dirty="0"/>
           </a:p>
         </p:txBody>
       </p:sp>
@@ -6557,7 +6602,7 @@
         <p:spPr>
           <a:xfrm>
             <a:off x="827584" y="1772816"/>
-            <a:ext cx="7632848" cy="3508653"/>
+            <a:ext cx="7632848" cy="3139321"/>
           </a:xfrm>
           <a:prstGeom prst="rect">
             <a:avLst/>
@@ -6569,22 +6614,34 @@
           </a:bodyPr>
           <a:lstStyle/>
           <a:p>
-            <a:r>
-              <a:rPr lang="pt-BR" sz="2800" dirty="0"/>
+            <a:pPr marL="285750" indent="-285750">
+              <a:buFont typeface="Arial" panose="020B0604020202020204" pitchFamily="34" charset="0"/>
+              <a:buChar char="•"/>
+            </a:pPr>
+            <a:r>
+              <a:rPr lang="pt-BR" sz="2400" b="1" dirty="0">
+                <a:solidFill>
+                  <a:schemeClr val="tx2"/>
+                </a:solidFill>
+                <a:latin typeface="Arial" panose="020B0604020202020204" pitchFamily="34" charset="0"/>
+              </a:rPr>
               <a:t>Análise </a:t>
             </a:r>
             <a:r>
-              <a:rPr lang="pt-BR" sz="2800" dirty="0" smtClean="0"/>
+              <a:rPr lang="pt-BR" sz="2400" b="1" dirty="0">
+                <a:solidFill>
+                  <a:schemeClr val="tx2"/>
+                </a:solidFill>
+                <a:latin typeface="Arial" panose="020B0604020202020204" pitchFamily="34" charset="0"/>
+              </a:rPr>
               <a:t>Laboratorial</a:t>
             </a:r>
-            <a:endParaRPr lang="pt-BR" sz="2400" dirty="0"/>
-          </a:p>
-          <a:p>
-            <a:r>
-              <a:rPr lang="pt-BR" sz="2000" dirty="0"/>
-              <a:t> </a:t>
-            </a:r>
-            <a:endParaRPr lang="pt-BR" sz="2000" dirty="0" smtClean="0"/>
+            <a:endParaRPr lang="pt-BR" sz="2400" b="1" dirty="0">
+              <a:solidFill>
+                <a:schemeClr val="tx2"/>
+              </a:solidFill>
+              <a:latin typeface="Arial" panose="020B0604020202020204" pitchFamily="34" charset="0"/>
+            </a:endParaRPr>
           </a:p>
           <a:p>
             <a:endParaRPr lang="pt-BR" sz="2000" dirty="0"/>
@@ -6732,12 +6789,7 @@
             <p:ph type="title"/>
           </p:nvPr>
         </p:nvSpPr>
-        <p:spPr>
-          <a:xfrm>
-            <a:off x="467544" y="188640"/>
-            <a:ext cx="8229600" cy="1600200"/>
-          </a:xfrm>
-        </p:spPr>
+        <p:spPr/>
         <p:txBody>
           <a:bodyPr/>
           <a:lstStyle/>
@@ -6751,6 +6803,83 @@
               <a:t>concorrentes</a:t>
             </a:r>
             <a:endParaRPr lang="pt-BR" dirty="0"/>
+          </a:p>
+        </p:txBody>
+      </p:sp>
+      <p:sp>
+        <p:nvSpPr>
+          <p:cNvPr id="2" name="Content Placeholder 1"/>
+          <p:cNvSpPr>
+            <a:spLocks noGrp="1"/>
+          </p:cNvSpPr>
+          <p:nvPr>
+            <p:ph idx="1"/>
+          </p:nvPr>
+        </p:nvSpPr>
+        <p:spPr/>
+        <p:txBody>
+          <a:bodyPr>
+            <a:noAutofit/>
+          </a:bodyPr>
+          <a:lstStyle/>
+          <a:p>
+            <a:pPr marL="285750" indent="-285750"/>
+            <a:r>
+              <a:rPr lang="pt-BR" sz="2800" b="1" dirty="0">
+                <a:solidFill>
+                  <a:schemeClr val="tx2"/>
+                </a:solidFill>
+                <a:latin typeface="Arial" panose="020B0604020202020204" pitchFamily="34" charset="0"/>
+              </a:rPr>
+              <a:t>Direto:</a:t>
+            </a:r>
+          </a:p>
+          <a:p>
+            <a:pPr lvl="1"/>
+            <a:r>
+              <a:rPr lang="pt-BR" sz="2800" dirty="0" smtClean="0"/>
+              <a:t>ProDoctor Software</a:t>
+            </a:r>
+          </a:p>
+          <a:p>
+            <a:pPr lvl="1"/>
+            <a:r>
+              <a:rPr lang="pt-BR" sz="2800" dirty="0" smtClean="0"/>
+              <a:t>HiDoctor Software Médico</a:t>
+            </a:r>
+            <a:endParaRPr lang="pt-BR" sz="2800" dirty="0"/>
+          </a:p>
+          <a:p>
+            <a:pPr marL="457200" lvl="1" indent="0">
+              <a:buNone/>
+            </a:pPr>
+            <a:endParaRPr lang="pt-BR" sz="2800" dirty="0" smtClean="0"/>
+          </a:p>
+          <a:p>
+            <a:pPr marL="285750" indent="-285750"/>
+            <a:r>
+              <a:rPr lang="pt-BR" sz="2800" b="1" dirty="0">
+                <a:solidFill>
+                  <a:schemeClr val="tx2"/>
+                </a:solidFill>
+                <a:latin typeface="Arial" panose="020B0604020202020204" pitchFamily="34" charset="0"/>
+              </a:rPr>
+              <a:t>Indireto:</a:t>
+            </a:r>
+          </a:p>
+          <a:p>
+            <a:pPr lvl="1"/>
+            <a:r>
+              <a:rPr lang="pt-BR" sz="2800" dirty="0" smtClean="0"/>
+              <a:t>Mv Sistemas</a:t>
+            </a:r>
+          </a:p>
+          <a:p>
+            <a:pPr lvl="1"/>
+            <a:r>
+              <a:rPr lang="pt-BR" sz="2800" dirty="0" smtClean="0"/>
+              <a:t>Totvs Sistemas</a:t>
+            </a:r>
           </a:p>
         </p:txBody>
       </p:sp>
@@ -7061,7 +7190,6 @@
               <a:rPr lang="pt-BR" sz="2000" b="1" dirty="0" smtClean="0"/>
               <a:t>Empresa;</a:t>
             </a:r>
-            <a:endParaRPr lang="pt-BR" sz="2000" b="1" dirty="0" smtClean="0"/>
           </a:p>
           <a:p>
             <a:pPr lvl="1"/>
@@ -7313,6 +7441,13 @@
   <p:clrMapOvr>
     <a:masterClrMapping/>
   </p:clrMapOvr>
+  <p:timing>
+    <p:tnLst>
+      <p:par>
+        <p:cTn id="1" dur="indefinite" restart="never" nodeType="tmRoot"/>
+      </p:par>
+    </p:tnLst>
+  </p:timing>
 </p:sld>
 </file>
 
@@ -7391,8 +7526,8 @@
         </p:nvSpPr>
         <p:spPr>
           <a:xfrm>
-            <a:off x="467544" y="2274838"/>
-            <a:ext cx="8229600" cy="3447098"/>
+            <a:off x="899592" y="1988840"/>
+            <a:ext cx="7632848" cy="3539430"/>
           </a:xfrm>
           <a:prstGeom prst="rect">
             <a:avLst/>
@@ -7404,111 +7539,115 @@
           </a:bodyPr>
           <a:lstStyle/>
           <a:p>
-            <a:r>
-              <a:rPr lang="pt-BR" sz="2000" b="1" dirty="0">
+            <a:pPr marL="457200" indent="-457200" algn="just">
+              <a:buFont typeface="Arial" pitchFamily="34" charset="0"/>
+              <a:buChar char="•"/>
+            </a:pPr>
+            <a:r>
+              <a:rPr lang="pt-BR" sz="2800" b="1" dirty="0" smtClean="0">
                 <a:latin typeface="Arial" panose="020B0604020202020204" pitchFamily="34" charset="0"/>
               </a:rPr>
-              <a:t>A ANS Sistemas está preocupada com a conservação do meio ambiente. Nossos sistemas auxiliam na redução do manejo e impressão de papeis em até 90% e no aumento do controle das atividades administrativas e </a:t>
-            </a:r>
-            <a:r>
-              <a:rPr lang="pt-BR" sz="2000" b="1" dirty="0" smtClean="0">
+              <a:t>Preço abaixo do mercado;</a:t>
+            </a:r>
+          </a:p>
+          <a:p>
+            <a:pPr marL="457200" indent="-457200" algn="just">
+              <a:buFont typeface="Arial" pitchFamily="34" charset="0"/>
+              <a:buChar char="•"/>
+            </a:pPr>
+            <a:r>
+              <a:rPr lang="pt-BR" sz="2800" b="1" dirty="0" smtClean="0">
                 <a:latin typeface="Arial" panose="020B0604020202020204" pitchFamily="34" charset="0"/>
               </a:rPr>
+              <a:t>Customizações ilimitadas*;</a:t>
+            </a:r>
+          </a:p>
+          <a:p>
+            <a:pPr marL="457200" indent="-457200" algn="just">
+              <a:buFont typeface="Arial" pitchFamily="34" charset="0"/>
+              <a:buChar char="•"/>
+            </a:pPr>
+            <a:r>
+              <a:rPr lang="pt-BR" sz="2800" b="1" dirty="0" smtClean="0">
+                <a:latin typeface="Arial" panose="020B0604020202020204" pitchFamily="34" charset="0"/>
+              </a:rPr>
+              <a:t>Preocupação</a:t>
+            </a:r>
+            <a:r>
+              <a:rPr lang="pt-BR" sz="2800" b="1" dirty="0" smtClean="0">
+                <a:latin typeface="Arial" panose="020B0604020202020204" pitchFamily="34" charset="0"/>
+              </a:rPr>
+              <a:t> </a:t>
+            </a:r>
+            <a:r>
+              <a:rPr lang="pt-BR" sz="2800" b="1" dirty="0">
+                <a:latin typeface="Arial" panose="020B0604020202020204" pitchFamily="34" charset="0"/>
+              </a:rPr>
+              <a:t>com a conservação do meio ambiente. </a:t>
+            </a:r>
+            <a:r>
+              <a:rPr lang="pt-BR" sz="2800" b="1" dirty="0" smtClean="0">
+                <a:latin typeface="Arial" panose="020B0604020202020204" pitchFamily="34" charset="0"/>
+              </a:rPr>
+              <a:t>Seu sistema auxilia </a:t>
+            </a:r>
+            <a:r>
+              <a:rPr lang="pt-BR" sz="2800" b="1" dirty="0">
+                <a:latin typeface="Arial" panose="020B0604020202020204" pitchFamily="34" charset="0"/>
+              </a:rPr>
+              <a:t>na redução do manejo e impressão de papeis em até 90% e no aumento do controle das atividades administrativas e </a:t>
+            </a:r>
+            <a:r>
+              <a:rPr lang="pt-BR" sz="2800" b="1" dirty="0" smtClean="0">
+                <a:latin typeface="Arial" panose="020B0604020202020204" pitchFamily="34" charset="0"/>
+              </a:rPr>
               <a:t>financeiras </a:t>
             </a:r>
             <a:r>
-              <a:rPr lang="pt-BR" sz="2000" b="1" dirty="0">
+              <a:rPr lang="pt-BR" sz="2800" b="1" dirty="0">
                 <a:latin typeface="Arial" panose="020B0604020202020204" pitchFamily="34" charset="0"/>
               </a:rPr>
-              <a:t>de sua empresa.</a:t>
-            </a:r>
-          </a:p>
-          <a:p>
-            <a:r>
-              <a:rPr lang="pt-BR" sz="2000" b="1" dirty="0">
+              <a:t>de </a:t>
+            </a:r>
+            <a:r>
+              <a:rPr lang="pt-BR" sz="2800" b="1" dirty="0" smtClean="0">
                 <a:latin typeface="Arial" panose="020B0604020202020204" pitchFamily="34" charset="0"/>
               </a:rPr>
-              <a:t>Alguns de nossos valores</a:t>
-            </a:r>
-            <a:r>
-              <a:rPr lang="pt-BR" sz="2000" b="1" dirty="0" smtClean="0">
-                <a:latin typeface="Arial" panose="020B0604020202020204" pitchFamily="34" charset="0"/>
-              </a:rPr>
-              <a:t>:</a:t>
-            </a:r>
-          </a:p>
-          <a:p>
-            <a:endParaRPr lang="pt-BR" sz="2000" b="1" i="0" dirty="0">
-              <a:effectLst/>
+              <a:t>seus clientes.</a:t>
+            </a:r>
+            <a:endParaRPr lang="pt-BR" sz="2800" b="1" dirty="0">
               <a:latin typeface="Arial" panose="020B0604020202020204" pitchFamily="34" charset="0"/>
             </a:endParaRPr>
           </a:p>
-          <a:p>
-            <a:pPr marL="285750" indent="-285750">
-              <a:buFont typeface="Arial" panose="020B0604020202020204" pitchFamily="34" charset="0"/>
-              <a:buChar char="•"/>
-            </a:pPr>
-            <a:r>
-              <a:rPr lang="pt-BR" sz="2000" b="1" i="0" dirty="0" smtClean="0">
-                <a:effectLst/>
-                <a:latin typeface="Arial" panose="020B0604020202020204" pitchFamily="34" charset="0"/>
-              </a:rPr>
-              <a:t>Transparência;</a:t>
-            </a:r>
-          </a:p>
-          <a:p>
-            <a:pPr marL="285750" indent="-285750">
-              <a:buFont typeface="Arial" panose="020B0604020202020204" pitchFamily="34" charset="0"/>
-              <a:buChar char="•"/>
-            </a:pPr>
-            <a:r>
-              <a:rPr lang="pt-BR" sz="2000" b="1" dirty="0" smtClean="0">
-                <a:latin typeface="Arial" panose="020B0604020202020204" pitchFamily="34" charset="0"/>
-              </a:rPr>
-              <a:t>Segurança;</a:t>
-            </a:r>
-          </a:p>
-          <a:p>
-            <a:pPr marL="285750" indent="-285750">
-              <a:buFont typeface="Arial" panose="020B0604020202020204" pitchFamily="34" charset="0"/>
-              <a:buChar char="•"/>
-            </a:pPr>
-            <a:r>
-              <a:rPr lang="pt-BR" sz="2000" b="1" i="0" dirty="0" smtClean="0">
-                <a:effectLst/>
-                <a:latin typeface="Arial" panose="020B0604020202020204" pitchFamily="34" charset="0"/>
-              </a:rPr>
-              <a:t>Disponibilidade;</a:t>
-            </a:r>
-          </a:p>
-          <a:p>
-            <a:pPr marL="285750" indent="-285750">
-              <a:buFont typeface="Arial" panose="020B0604020202020204" pitchFamily="34" charset="0"/>
-              <a:buChar char="•"/>
-            </a:pPr>
-            <a:r>
-              <a:rPr lang="pt-BR" sz="2000" b="1" dirty="0" smtClean="0">
-                <a:latin typeface="Arial" panose="020B0604020202020204" pitchFamily="34" charset="0"/>
-              </a:rPr>
-              <a:t>Experiência no Mercado;</a:t>
-            </a:r>
-          </a:p>
-          <a:p>
-            <a:pPr marL="285750" indent="-285750">
-              <a:buFont typeface="Arial" panose="020B0604020202020204" pitchFamily="34" charset="0"/>
-              <a:buChar char="•"/>
-            </a:pPr>
-            <a:r>
-              <a:rPr lang="pt-BR" sz="2000" b="1" i="0" dirty="0" smtClean="0">
-                <a:effectLst/>
-                <a:latin typeface="Arial" panose="020B0604020202020204" pitchFamily="34" charset="0"/>
-              </a:rPr>
-              <a:t>Responsabilidade;</a:t>
-            </a:r>
-            <a:endParaRPr lang="pt-BR" sz="2000" b="1" i="0" dirty="0">
-              <a:effectLst/>
-              <a:latin typeface="Arial" panose="020B0604020202020204" pitchFamily="34" charset="0"/>
-            </a:endParaRPr>
+        </p:txBody>
+      </p:sp>
+      <p:sp>
+        <p:nvSpPr>
+          <p:cNvPr id="3" name="TextBox 2"/>
+          <p:cNvSpPr txBox="1"/>
+          <p:nvPr/>
+        </p:nvSpPr>
+        <p:spPr>
+          <a:xfrm>
+            <a:off x="1331640" y="6070038"/>
+            <a:ext cx="6768752" cy="584775"/>
+          </a:xfrm>
+          <a:prstGeom prst="rect">
+            <a:avLst/>
+          </a:prstGeom>
+          <a:noFill/>
+        </p:spPr>
+        <p:txBody>
+          <a:bodyPr wrap="square" rtlCol="0">
+            <a:spAutoFit/>
+          </a:bodyPr>
+          <a:lstStyle/>
+          <a:p>
+            <a:r>
+              <a:rPr lang="pt-BR" sz="1600" dirty="0" smtClean="0"/>
+              <a:t>*As solicitações de customização passam por uma análise, caso seja aprovada, será entregue dentro de um prazo de até quatro meses.</a:t>
+            </a:r>
+            <a:endParaRPr lang="pt-BR" sz="1600" dirty="0"/>
           </a:p>
         </p:txBody>
       </p:sp>
@@ -7522,6 +7661,13 @@
   <p:clrMapOvr>
     <a:masterClrMapping/>
   </p:clrMapOvr>
+  <p:timing>
+    <p:tnLst>
+      <p:par>
+        <p:cTn id="1" dur="indefinite" restart="never" nodeType="tmRoot"/>
+      </p:par>
+    </p:tnLst>
+  </p:timing>
 </p:sld>
 </file>
 
@@ -7795,7 +7941,15 @@
                   <a:srgbClr val="FFC000"/>
                 </a:solidFill>
               </a:rPr>
-              <a:t>Introdução À empresa:</a:t>
+              <a:t>Apresentação da empresa:</a:t>
+            </a:r>
+            <a:r>
+              <a:rPr lang="pt-BR" dirty="0" smtClean="0">
+                <a:solidFill>
+                  <a:srgbClr val="FFC000"/>
+                </a:solidFill>
+              </a:rPr>
+              <a:t/>
             </a:r>
             <a:br>
               <a:rPr lang="pt-BR" dirty="0" smtClean="0">
@@ -7815,7 +7969,7 @@
     </p:spTree>
     <p:extLst>
       <p:ext uri="{BB962C8B-B14F-4D97-AF65-F5344CB8AC3E}">
-        <p14:creationId xmlns:p14="http://schemas.microsoft.com/office/powerpoint/2010/main" val="2609460090"/>
+        <p14:creationId xmlns:p14="http://schemas.microsoft.com/office/powerpoint/2010/main" val="1632066025"/>
       </p:ext>
     </p:extLst>
   </p:cSld>
@@ -7863,7 +8017,7 @@
                   <a:srgbClr val="FFC000"/>
                 </a:solidFill>
               </a:rPr>
-              <a:t>INTRODUÇÃO</a:t>
+              <a:t>apresentaÇÃO DA EMPRESA</a:t>
             </a:r>
             <a:endParaRPr lang="pt-BR" dirty="0">
               <a:solidFill>
@@ -7898,166 +8052,6 @@
             <a:pPr marL="0" indent="0" algn="just">
               <a:buNone/>
             </a:pPr>
-            <a:r>
-              <a:rPr lang="pt-BR" sz="2400" dirty="0">
-                <a:effectLst/>
-              </a:rPr>
-              <a:t>ANS Sistemas é uma empresa focada nas necessidades tecnológicas do mercado brasileiro. A equipe ANS Sistemas é composta por profissionais experientes que já realizaram serviços em grandes empresas </a:t>
-            </a:r>
-            <a:r>
-              <a:rPr lang="pt-BR" sz="2400" dirty="0" smtClean="0">
-                <a:effectLst/>
-              </a:rPr>
-              <a:t>(</a:t>
-            </a:r>
-            <a:r>
-              <a:rPr lang="pt-BR" sz="2400" dirty="0" err="1" smtClean="0">
-                <a:solidFill>
-                  <a:srgbClr val="FFC000"/>
-                </a:solidFill>
-                <a:effectLst/>
-              </a:rPr>
-              <a:t>Walmart</a:t>
-            </a:r>
-            <a:r>
-              <a:rPr lang="pt-BR" sz="2400" dirty="0" smtClean="0">
-                <a:solidFill>
-                  <a:srgbClr val="FFC000"/>
-                </a:solidFill>
-                <a:effectLst/>
-              </a:rPr>
-              <a:t> </a:t>
-            </a:r>
-            <a:r>
-              <a:rPr lang="pt-BR" sz="2400" dirty="0">
-                <a:solidFill>
-                  <a:srgbClr val="FFC000"/>
-                </a:solidFill>
-                <a:effectLst/>
-              </a:rPr>
-              <a:t>Brasil, </a:t>
-            </a:r>
-            <a:r>
-              <a:rPr lang="pt-BR" sz="2400" dirty="0" err="1">
-                <a:solidFill>
-                  <a:srgbClr val="FFC000"/>
-                </a:solidFill>
-                <a:effectLst/>
-              </a:rPr>
-              <a:t>Mauricea</a:t>
-            </a:r>
-            <a:r>
-              <a:rPr lang="pt-BR" sz="2400" dirty="0">
-                <a:solidFill>
-                  <a:srgbClr val="FFC000"/>
-                </a:solidFill>
-                <a:effectLst/>
-              </a:rPr>
-              <a:t>, Hospital Municipal de </a:t>
-            </a:r>
-            <a:r>
-              <a:rPr lang="pt-BR" sz="2400" dirty="0" err="1" smtClean="0">
-                <a:solidFill>
-                  <a:srgbClr val="FFC000"/>
-                </a:solidFill>
-                <a:effectLst/>
-              </a:rPr>
-              <a:t>Ipubi-PE,Casa</a:t>
-            </a:r>
-            <a:r>
-              <a:rPr lang="pt-BR" sz="2400" dirty="0" smtClean="0">
-                <a:solidFill>
-                  <a:srgbClr val="FFC000"/>
-                </a:solidFill>
-                <a:effectLst/>
-              </a:rPr>
-              <a:t> </a:t>
-            </a:r>
-            <a:r>
-              <a:rPr lang="pt-BR" sz="2400" dirty="0">
-                <a:solidFill>
-                  <a:srgbClr val="FFC000"/>
-                </a:solidFill>
-                <a:effectLst/>
-              </a:rPr>
-              <a:t>de Saúde </a:t>
-            </a:r>
-            <a:r>
-              <a:rPr lang="pt-BR" sz="2400" dirty="0" err="1">
-                <a:solidFill>
-                  <a:srgbClr val="FFC000"/>
-                </a:solidFill>
-                <a:effectLst/>
-              </a:rPr>
-              <a:t>Nsra</a:t>
-            </a:r>
-            <a:r>
-              <a:rPr lang="pt-BR" sz="2400" dirty="0">
-                <a:solidFill>
-                  <a:srgbClr val="FFC000"/>
-                </a:solidFill>
-                <a:effectLst/>
-              </a:rPr>
-              <a:t> de </a:t>
-            </a:r>
-            <a:r>
-              <a:rPr lang="pt-BR" sz="2400" dirty="0" smtClean="0">
-                <a:solidFill>
-                  <a:srgbClr val="FFC000"/>
-                </a:solidFill>
-                <a:effectLst/>
-              </a:rPr>
-              <a:t>Fátima-</a:t>
-            </a:r>
-            <a:r>
-              <a:rPr lang="pt-BR" sz="2400" dirty="0" err="1" smtClean="0">
-                <a:solidFill>
-                  <a:srgbClr val="FFC000"/>
-                </a:solidFill>
-                <a:effectLst/>
-              </a:rPr>
-              <a:t>CE,etc</a:t>
-            </a:r>
-            <a:r>
-              <a:rPr lang="pt-BR" sz="2400" dirty="0" smtClean="0">
-                <a:effectLst/>
-              </a:rPr>
-              <a:t>).</a:t>
-            </a:r>
-            <a:endParaRPr lang="pt-BR" sz="2400" dirty="0">
-              <a:solidFill>
-                <a:schemeClr val="tx1"/>
-              </a:solidFill>
-            </a:endParaRPr>
-          </a:p>
-          <a:p>
-            <a:pPr marL="0" indent="0">
-              <a:buNone/>
-            </a:pPr>
-            <a:r>
-              <a:rPr lang="pt-BR" sz="2400" dirty="0">
-                <a:effectLst/>
-              </a:rPr>
-              <a:t> </a:t>
-            </a:r>
-            <a:r>
-              <a:rPr lang="pt-BR" sz="2400" dirty="0" smtClean="0">
-                <a:effectLst/>
-              </a:rPr>
-              <a:t>A ANS disponibiliza </a:t>
-            </a:r>
-            <a:r>
-              <a:rPr lang="pt-BR" sz="2400" dirty="0">
-                <a:effectLst/>
-              </a:rPr>
-              <a:t>Softwares para clínicas, hospitais </a:t>
-            </a:r>
-            <a:r>
-              <a:rPr lang="pt-BR" sz="2400" dirty="0" smtClean="0">
-                <a:effectLst/>
-              </a:rPr>
-              <a:t>e laboratórios.</a:t>
-            </a:r>
             <a:endParaRPr lang="pt-BR" sz="2400" dirty="0">
               <a:effectLst/>
             </a:endParaRPr>
@@ -8120,7 +8114,15 @@
                   <a:srgbClr val="FFC000"/>
                 </a:solidFill>
               </a:rPr>
-              <a:t>SÓCIOS FUNDADORES:</a:t>
+              <a:t>Sócios fundadores:</a:t>
+            </a:r>
+            <a:r>
+              <a:rPr lang="pt-BR" dirty="0" smtClean="0">
+                <a:solidFill>
+                  <a:srgbClr val="FFC000"/>
+                </a:solidFill>
+              </a:rPr>
+              <a:t/>
             </a:r>
             <a:br>
               <a:rPr lang="pt-BR" dirty="0" smtClean="0">
@@ -8140,7 +8142,7 @@
     </p:spTree>
     <p:extLst>
       <p:ext uri="{BB962C8B-B14F-4D97-AF65-F5344CB8AC3E}">
-        <p14:creationId xmlns:p14="http://schemas.microsoft.com/office/powerpoint/2010/main" val="3001200351"/>
+        <p14:creationId xmlns:p14="http://schemas.microsoft.com/office/powerpoint/2010/main" val="649394263"/>
       </p:ext>
     </p:extLst>
   </p:cSld>
@@ -8177,32 +8179,111 @@
             <p:ph type="title"/>
           </p:nvPr>
         </p:nvSpPr>
+        <p:spPr/>
+        <p:txBody>
+          <a:bodyPr/>
+          <a:lstStyle/>
+          <a:p>
+            <a:r>
+              <a:rPr lang="pt-BR" dirty="0" smtClean="0">
+                <a:solidFill>
+                  <a:srgbClr val="FFC000"/>
+                </a:solidFill>
+              </a:rPr>
+              <a:t>Sócios fundadores</a:t>
+            </a:r>
+            <a:endParaRPr lang="pt-BR" dirty="0"/>
+          </a:p>
+        </p:txBody>
+      </p:sp>
+      <p:sp>
+        <p:nvSpPr>
+          <p:cNvPr id="2" name="Content Placeholder 1"/>
+          <p:cNvSpPr>
+            <a:spLocks noGrp="1"/>
+          </p:cNvSpPr>
+          <p:nvPr>
+            <p:ph idx="1"/>
+          </p:nvPr>
+        </p:nvSpPr>
         <p:spPr>
           <a:xfrm>
-            <a:off x="467544" y="0"/>
-            <a:ext cx="8229600" cy="1600200"/>
+            <a:off x="904321" y="1700808"/>
+            <a:ext cx="7343038" cy="1656184"/>
           </a:xfrm>
         </p:spPr>
         <p:txBody>
-          <a:bodyPr/>
-          <a:lstStyle/>
-          <a:p>
-            <a:r>
-              <a:rPr lang="pt-BR" dirty="0" smtClean="0">
-                <a:solidFill>
-                  <a:srgbClr val="FFC000"/>
-                </a:solidFill>
-              </a:rPr>
-              <a:t>SÓCIOS FUNDADORES</a:t>
-            </a:r>
-            <a:endParaRPr lang="pt-BR" dirty="0"/>
+          <a:bodyPr>
+            <a:normAutofit fontScale="85000" lnSpcReduction="20000"/>
+          </a:bodyPr>
+          <a:lstStyle/>
+          <a:p>
+            <a:r>
+              <a:rPr lang="pt-BR" sz="3200" b="1" dirty="0" smtClean="0"/>
+              <a:t>Saulo Alencar	</a:t>
+            </a:r>
+          </a:p>
+          <a:p>
+            <a:r>
+              <a:rPr lang="pt-BR" sz="3200" b="1" dirty="0" smtClean="0"/>
+              <a:t>Alan Campos</a:t>
+            </a:r>
+          </a:p>
+          <a:p>
+            <a:r>
+              <a:rPr lang="pt-BR" sz="3200" b="1" dirty="0" smtClean="0"/>
+              <a:t>Clovis Campos</a:t>
+            </a:r>
+          </a:p>
+          <a:p>
+            <a:pPr marL="285750" indent="-285750"/>
+            <a:endParaRPr lang="pt-BR" sz="3200" b="1" dirty="0" smtClean="0"/>
+          </a:p>
+          <a:p>
+            <a:pPr marL="285750" indent="-285750"/>
+            <a:endParaRPr lang="pt-BR" sz="3200" b="1" dirty="0"/>
+          </a:p>
+          <a:p>
+            <a:pPr marL="285750" indent="-285750"/>
+            <a:endParaRPr lang="pt-BR" sz="3200" dirty="0"/>
+          </a:p>
+        </p:txBody>
+      </p:sp>
+      <p:sp>
+        <p:nvSpPr>
+          <p:cNvPr id="3" name="TextBox 2"/>
+          <p:cNvSpPr txBox="1"/>
+          <p:nvPr/>
+        </p:nvSpPr>
+        <p:spPr>
+          <a:xfrm>
+            <a:off x="403216" y="3459719"/>
+            <a:ext cx="8345248" cy="2800767"/>
+          </a:xfrm>
+          <a:prstGeom prst="rect">
+            <a:avLst/>
+          </a:prstGeom>
+          <a:noFill/>
+        </p:spPr>
+        <p:txBody>
+          <a:bodyPr wrap="square" rtlCol="0">
+            <a:spAutoFit/>
+          </a:bodyPr>
+          <a:lstStyle/>
+          <a:p>
+            <a:pPr algn="just"/>
+            <a:r>
+              <a:rPr lang="pt-BR" sz="2200" dirty="0" smtClean="0"/>
+              <a:t>O sistema foi inicialmente desenvolvido por Alan Campos e Clovis Campos, ao qual conseguiram desenvolver uma base para o sistema ANS e conseguir o primeiro cliente. Nessa mesma época Alan também trabalhava em uma empresa chamada “Informata”, ao qual Saulo começou a estagiar e conheçeu Alan,  após tomar conheçimento sobre o sistema, Saulo investiu na empresa entrando como sócio e posteriormente Clovis vende a parte dele para Saulo e Alan.</a:t>
+            </a:r>
+            <a:endParaRPr lang="pt-BR" sz="2200" dirty="0"/>
           </a:p>
         </p:txBody>
       </p:sp>
     </p:spTree>
     <p:extLst>
       <p:ext uri="{BB962C8B-B14F-4D97-AF65-F5344CB8AC3E}">
-        <p14:creationId xmlns:p14="http://schemas.microsoft.com/office/powerpoint/2010/main" val="2415585543"/>
+        <p14:creationId xmlns:p14="http://schemas.microsoft.com/office/powerpoint/2010/main" val="113994843"/>
       </p:ext>
     </p:extLst>
   </p:cSld>
@@ -8255,7 +8336,15 @@
                   <a:srgbClr val="FFC000"/>
                 </a:solidFill>
               </a:rPr>
-              <a:t>SEGMENTO DA EMPRESA:</a:t>
+              <a:t>Segmento da empresa:</a:t>
+            </a:r>
+            <a:r>
+              <a:rPr lang="pt-BR" dirty="0" smtClean="0">
+                <a:solidFill>
+                  <a:srgbClr val="FFC000"/>
+                </a:solidFill>
+              </a:rPr>
+              <a:t/>
             </a:r>
             <a:br>
               <a:rPr lang="pt-BR" dirty="0" smtClean="0">
@@ -8275,7 +8364,7 @@
     </p:spTree>
     <p:extLst>
       <p:ext uri="{BB962C8B-B14F-4D97-AF65-F5344CB8AC3E}">
-        <p14:creationId xmlns:p14="http://schemas.microsoft.com/office/powerpoint/2010/main" val="1857950548"/>
+        <p14:creationId xmlns:p14="http://schemas.microsoft.com/office/powerpoint/2010/main" val="2288103388"/>
       </p:ext>
     </p:extLst>
   </p:cSld>
@@ -8288,6 +8377,11 @@
 <file path=ppt/slides/slide8.xml><?xml version="1.0" encoding="utf-8"?>
 <p:sld xmlns:a="http://schemas.openxmlformats.org/drawingml/2006/main" xmlns:r="http://schemas.openxmlformats.org/officeDocument/2006/relationships" xmlns:p="http://schemas.openxmlformats.org/presentationml/2006/main">
   <p:cSld>
+    <p:bg>
+      <p:bgRef idx="1003">
+        <a:schemeClr val="bg2"/>
+      </p:bgRef>
+    </p:bg>
     <p:spTree>
       <p:nvGrpSpPr>
         <p:cNvPr id="1" name=""/>
@@ -8312,25 +8406,72 @@
             <p:ph type="title"/>
           </p:nvPr>
         </p:nvSpPr>
+        <p:spPr/>
+        <p:txBody>
+          <a:bodyPr/>
+          <a:lstStyle/>
+          <a:p>
+            <a:r>
+              <a:rPr lang="pt-BR" dirty="0" smtClean="0">
+                <a:solidFill>
+                  <a:srgbClr val="FFC000"/>
+                </a:solidFill>
+              </a:rPr>
+              <a:t>SEGMENTO DA EMPRESA</a:t>
+            </a:r>
+            <a:endParaRPr lang="pt-BR" dirty="0"/>
+          </a:p>
+        </p:txBody>
+      </p:sp>
+      <p:sp>
+        <p:nvSpPr>
+          <p:cNvPr id="2" name="Content Placeholder 1"/>
+          <p:cNvSpPr>
+            <a:spLocks noGrp="1"/>
+          </p:cNvSpPr>
+          <p:nvPr>
+            <p:ph idx="1"/>
+          </p:nvPr>
+        </p:nvSpPr>
         <p:spPr>
           <a:xfrm>
-            <a:off x="467544" y="-1100"/>
-            <a:ext cx="8229600" cy="1600200"/>
+            <a:off x="899592" y="2060848"/>
+            <a:ext cx="7343038" cy="3695136"/>
           </a:xfrm>
         </p:spPr>
         <p:txBody>
-          <a:bodyPr/>
-          <a:lstStyle/>
-          <a:p>
-            <a:r>
-              <a:rPr lang="pt-BR" dirty="0" smtClean="0">
-                <a:solidFill>
-                  <a:srgbClr val="FFC000"/>
-                </a:solidFill>
-              </a:rPr>
-              <a:t>SEGMENTO DA EMPRESA</a:t>
-            </a:r>
-            <a:endParaRPr lang="pt-BR" dirty="0"/>
+          <a:bodyPr>
+            <a:normAutofit/>
+          </a:bodyPr>
+          <a:lstStyle/>
+          <a:p>
+            <a:pPr marL="285750" indent="-285750"/>
+            <a:r>
+              <a:rPr lang="pt-BR" sz="3200" b="1" dirty="0">
+                <a:solidFill>
+                  <a:schemeClr val="tx2"/>
+                </a:solidFill>
+                <a:latin typeface="Arial" panose="020B0604020202020204" pitchFamily="34" charset="0"/>
+              </a:rPr>
+              <a:t>Prestação de serviços</a:t>
+            </a:r>
+            <a:r>
+              <a:rPr lang="pt-BR" sz="3200" b="1" dirty="0">
+                <a:solidFill>
+                  <a:schemeClr val="tx2"/>
+                </a:solidFill>
+                <a:latin typeface="Arial" panose="020B0604020202020204" pitchFamily="34" charset="0"/>
+              </a:rPr>
+              <a:t>:</a:t>
+            </a:r>
+          </a:p>
+          <a:p>
+            <a:pPr lvl="1" algn="just"/>
+            <a:r>
+              <a:rPr lang="pt-BR" sz="3200" dirty="0" smtClean="0"/>
+              <a:t>Área de Saúde. </a:t>
+            </a:r>
+            <a:endParaRPr lang="pt-BR" sz="3200" dirty="0"/>
           </a:p>
         </p:txBody>
       </p:sp>
@@ -8342,7 +8483,7 @@
     </p:extLst>
   </p:cSld>
   <p:clrMapOvr>
-    <a:masterClrMapping/>
+    <a:overrideClrMapping bg1="dk1" tx1="lt1" bg2="dk2" tx2="lt2" accent1="accent1" accent2="accent2" accent3="accent3" accent4="accent4" accent5="accent5" accent6="accent6" hlink="hlink" folHlink="folHlink"/>
   </p:clrMapOvr>
 </p:sld>
 </file>
@@ -8463,7 +8604,7 @@
     </a:clrScheme>
     <a:fontScheme name="Damask">
       <a:majorFont>
-        <a:latin typeface="Bookman Old Style" panose="02050604050505020204"/>
+        <a:latin typeface="Bookman Old Style"/>
         <a:ea typeface=""/>
         <a:cs typeface=""/>
         <a:font script="Jpan" typeface="ＭＳ Ｐゴシック"/>
@@ -8498,7 +8639,7 @@
         <a:font script="Geor" typeface="Sylfaen"/>
       </a:majorFont>
       <a:minorFont>
-        <a:latin typeface="Rockwell" panose="02060603020205020403"/>
+        <a:latin typeface="Rockwell"/>
         <a:ea typeface=""/>
         <a:cs typeface=""/>
         <a:font script="Jpan" typeface="ＭＳ Ｐゴシック"/>
@@ -8670,8 +8811,51 @@
   <a:extraClrSchemeLst/>
   <a:extLst>
     <a:ext uri="{05A4C25C-085E-4340-85A3-A5531E510DB2}">
-      <thm15:themeFamily xmlns:thm15="http://schemas.microsoft.com/office/thememl/2012/main" name="Damask" id="{F9A299A0-33D0-4E0F-9F3F-7163E3744208}" vid="{746EEEEA-FB6A-406B-B510-531588D54811}"/>
+      <thm15:themeFamily xmlns:thm15="http://schemas.microsoft.com/office/thememl/2012/main" xmlns="" name="Damask" id="{F9A299A0-33D0-4E0F-9F3F-7163E3744208}" vid="{746EEEEA-FB6A-406B-B510-531588D54811}"/>
     </a:ext>
   </a:extLst>
 </a:theme>
+</file>
+
+<file path=ppt/theme/themeOverride1.xml><?xml version="1.0" encoding="utf-8"?>
+<a:themeOverride xmlns:a="http://schemas.openxmlformats.org/drawingml/2006/main">
+  <a:clrScheme name="Damask">
+    <a:dk1>
+      <a:sysClr val="windowText" lastClr="000000"/>
+    </a:dk1>
+    <a:lt1>
+      <a:sysClr val="window" lastClr="FFFFFF"/>
+    </a:lt1>
+    <a:dk2>
+      <a:srgbClr val="2A5B7F"/>
+    </a:dk2>
+    <a:lt2>
+      <a:srgbClr val="ABDAFC"/>
+    </a:lt2>
+    <a:accent1>
+      <a:srgbClr val="9EC544"/>
+    </a:accent1>
+    <a:accent2>
+      <a:srgbClr val="50BEA3"/>
+    </a:accent2>
+    <a:accent3>
+      <a:srgbClr val="4A9CCC"/>
+    </a:accent3>
+    <a:accent4>
+      <a:srgbClr val="9A66CA"/>
+    </a:accent4>
+    <a:accent5>
+      <a:srgbClr val="C54F71"/>
+    </a:accent5>
+    <a:accent6>
+      <a:srgbClr val="DE9C3C"/>
+    </a:accent6>
+    <a:hlink>
+      <a:srgbClr val="6BA9DA"/>
+    </a:hlink>
+    <a:folHlink>
+      <a:srgbClr val="A0BCD3"/>
+    </a:folHlink>
+  </a:clrScheme>
+</a:themeOverride>
 </file>
</xml_diff>

<commit_message>
Adição da Politica de Preço
</commit_message>
<xml_diff>
--- a/Docs/Apresentação ANS Sistemas (Fundamentos da Gestao).pptx
+++ b/Docs/Apresentação ANS Sistemas (Fundamentos da Gestao).pptx
@@ -30,7 +30,7 @@
     <p:sldId id="308" r:id="rId24"/>
     <p:sldId id="287" r:id="rId25"/>
   </p:sldIdLst>
-  <p:sldSz cx="9144000" cy="6858000" type="screen4x3"/>
+  <p:sldSz cx="12192000" cy="6858000"/>
   <p:notesSz cx="6858000" cy="9144000"/>
   <p:defaultTextStyle>
     <a:defPPr>
@@ -129,13 +129,13 @@
   </p:defaultTextStyle>
   <p:extLst>
     <p:ext uri="{EFAFB233-063F-42B5-8137-9DF3F51BA10A}">
-      <p15:sldGuideLst xmlns:p15="http://schemas.microsoft.com/office/powerpoint/2012/main" xmlns="">
-        <p15:guide id="1" orient="horz" pos="2160">
+      <p15:sldGuideLst xmlns:p15="http://schemas.microsoft.com/office/powerpoint/2012/main">
+        <p15:guide id="1" orient="horz" pos="2160" userDrawn="1">
           <p15:clr>
             <a:srgbClr val="A4A3A4"/>
           </p15:clr>
         </p15:guide>
-        <p15:guide id="2" pos="2880">
+        <p15:guide id="2" pos="3840" userDrawn="1">
           <p15:clr>
             <a:srgbClr val="A4A3A4"/>
           </p15:clr>
@@ -179,8 +179,8 @@
         </p:nvSpPr>
         <p:spPr>
           <a:xfrm>
-            <a:off x="685347" y="1122363"/>
-            <a:ext cx="7773308" cy="2387600"/>
+            <a:off x="913796" y="1122363"/>
+            <a:ext cx="10364411" cy="2387600"/>
           </a:xfrm>
         </p:spPr>
         <p:txBody>
@@ -213,8 +213,8 @@
         </p:nvSpPr>
         <p:spPr>
           <a:xfrm>
-            <a:off x="685347" y="3602038"/>
-            <a:ext cx="7773308" cy="1655762"/>
+            <a:off x="913796" y="3602038"/>
+            <a:ext cx="10364411" cy="1655762"/>
           </a:xfrm>
         </p:spPr>
         <p:txBody>
@@ -283,7 +283,7 @@
           <a:p>
             <a:fld id="{8EE831F1-ED05-4BAA-8C74-2BAAB7F343BB}" type="datetimeFigureOut">
               <a:rPr lang="pt-BR" smtClean="0"/>
-              <a:t>17/06/2017</a:t>
+              <a:t>19/06/2017</a:t>
             </a:fld>
             <a:endParaRPr lang="pt-BR"/>
           </a:p>
@@ -325,7 +325,7 @@
           <a:p>
             <a:fld id="{EF5993D9-3239-4E1A-B177-3A3DADB6A390}" type="slidenum">
               <a:rPr lang="pt-BR" smtClean="0"/>
-              <a:t>‹#›</a:t>
+              <a:t>‹nº›</a:t>
             </a:fld>
             <a:endParaRPr lang="pt-BR"/>
           </a:p>
@@ -373,8 +373,8 @@
         </p:nvSpPr>
         <p:spPr>
           <a:xfrm>
-            <a:off x="685355" y="4289373"/>
-            <a:ext cx="7775673" cy="819355"/>
+            <a:off x="913807" y="4289374"/>
+            <a:ext cx="10367564" cy="819355"/>
           </a:xfrm>
         </p:spPr>
         <p:txBody>
@@ -407,8 +407,8 @@
         </p:nvSpPr>
         <p:spPr>
           <a:xfrm>
-            <a:off x="685355" y="621322"/>
-            <a:ext cx="7775673" cy="3379735"/>
+            <a:off x="913807" y="621323"/>
+            <a:ext cx="10367564" cy="3379735"/>
           </a:xfrm>
           <a:noFill/>
           <a:ln w="190500" cap="sq">
@@ -498,8 +498,8 @@
         </p:nvSpPr>
         <p:spPr>
           <a:xfrm>
-            <a:off x="685346" y="5108728"/>
-            <a:ext cx="7774499" cy="682472"/>
+            <a:off x="913795" y="5108728"/>
+            <a:ext cx="10365999" cy="682472"/>
           </a:xfrm>
         </p:spPr>
         <p:txBody>
@@ -570,7 +570,7 @@
           <a:p>
             <a:fld id="{8EE831F1-ED05-4BAA-8C74-2BAAB7F343BB}" type="datetimeFigureOut">
               <a:rPr lang="pt-BR" smtClean="0"/>
-              <a:t>17/06/2017</a:t>
+              <a:t>19/06/2017</a:t>
             </a:fld>
             <a:endParaRPr lang="pt-BR"/>
           </a:p>
@@ -612,7 +612,7 @@
           <a:p>
             <a:fld id="{EF5993D9-3239-4E1A-B177-3A3DADB6A390}" type="slidenum">
               <a:rPr lang="pt-BR" smtClean="0"/>
-              <a:t>‹#›</a:t>
+              <a:t>‹nº›</a:t>
             </a:fld>
             <a:endParaRPr lang="pt-BR"/>
           </a:p>
@@ -660,8 +660,8 @@
         </p:nvSpPr>
         <p:spPr>
           <a:xfrm>
-            <a:off x="685346" y="609601"/>
-            <a:ext cx="7765322" cy="3424859"/>
+            <a:off x="913795" y="609602"/>
+            <a:ext cx="10353763" cy="3424859"/>
           </a:xfrm>
         </p:spPr>
         <p:txBody>
@@ -692,8 +692,8 @@
         </p:nvSpPr>
         <p:spPr>
           <a:xfrm>
-            <a:off x="685347" y="4204820"/>
-            <a:ext cx="7765321" cy="1592186"/>
+            <a:off x="913797" y="4204820"/>
+            <a:ext cx="10353761" cy="1592186"/>
           </a:xfrm>
         </p:spPr>
         <p:txBody>
@@ -762,7 +762,7 @@
           <a:p>
             <a:fld id="{8EE831F1-ED05-4BAA-8C74-2BAAB7F343BB}" type="datetimeFigureOut">
               <a:rPr lang="pt-BR" smtClean="0"/>
-              <a:t>17/06/2017</a:t>
+              <a:t>19/06/2017</a:t>
             </a:fld>
             <a:endParaRPr lang="pt-BR"/>
           </a:p>
@@ -804,7 +804,7 @@
           <a:p>
             <a:fld id="{EF5993D9-3239-4E1A-B177-3A3DADB6A390}" type="slidenum">
               <a:rPr lang="pt-BR" smtClean="0"/>
-              <a:t>‹#›</a:t>
+              <a:t>‹nº›</a:t>
             </a:fld>
             <a:endParaRPr lang="pt-BR"/>
           </a:p>
@@ -852,8 +852,8 @@
         </p:nvSpPr>
         <p:spPr>
           <a:xfrm>
-            <a:off x="1084659" y="609600"/>
-            <a:ext cx="6977064" cy="2992904"/>
+            <a:off x="1446212" y="609600"/>
+            <a:ext cx="9302752" cy="2992904"/>
           </a:xfrm>
         </p:spPr>
         <p:txBody>
@@ -884,8 +884,8 @@
         </p:nvSpPr>
         <p:spPr>
           <a:xfrm>
-            <a:off x="1290484" y="3610032"/>
-            <a:ext cx="6564224" cy="426812"/>
+            <a:off x="1720645" y="3610032"/>
+            <a:ext cx="8752299" cy="426812"/>
           </a:xfrm>
         </p:spPr>
         <p:txBody>
@@ -951,8 +951,8 @@
         </p:nvSpPr>
         <p:spPr>
           <a:xfrm>
-            <a:off x="685345" y="4204821"/>
-            <a:ext cx="7765322" cy="1586380"/>
+            <a:off x="913793" y="4204821"/>
+            <a:ext cx="10353763" cy="1586380"/>
           </a:xfrm>
         </p:spPr>
         <p:txBody>
@@ -1023,7 +1023,7 @@
           <a:p>
             <a:fld id="{8EE831F1-ED05-4BAA-8C74-2BAAB7F343BB}" type="datetimeFigureOut">
               <a:rPr lang="pt-BR" smtClean="0"/>
-              <a:t>17/06/2017</a:t>
+              <a:t>19/06/2017</a:t>
             </a:fld>
             <a:endParaRPr lang="pt-BR"/>
           </a:p>
@@ -1065,7 +1065,7 @@
           <a:p>
             <a:fld id="{EF5993D9-3239-4E1A-B177-3A3DADB6A390}" type="slidenum">
               <a:rPr lang="pt-BR" smtClean="0"/>
-              <a:t>‹#›</a:t>
+              <a:t>‹nº›</a:t>
             </a:fld>
             <a:endParaRPr lang="pt-BR"/>
           </a:p>
@@ -1079,8 +1079,8 @@
         </p:nvSpPr>
         <p:spPr>
           <a:xfrm>
-            <a:off x="505245" y="641749"/>
-            <a:ext cx="457200" cy="584776"/>
+            <a:off x="673660" y="641749"/>
+            <a:ext cx="609600" cy="584776"/>
           </a:xfrm>
           <a:prstGeom prst="rect">
             <a:avLst/>
@@ -1195,8 +1195,8 @@
         </p:nvSpPr>
         <p:spPr>
           <a:xfrm>
-            <a:off x="7946721" y="3073376"/>
-            <a:ext cx="457200" cy="584776"/>
+            <a:off x="10595628" y="3073376"/>
+            <a:ext cx="609600" cy="584776"/>
           </a:xfrm>
           <a:prstGeom prst="rect">
             <a:avLst/>
@@ -1345,8 +1345,8 @@
         </p:nvSpPr>
         <p:spPr>
           <a:xfrm>
-            <a:off x="685355" y="2126943"/>
-            <a:ext cx="7766495" cy="2511835"/>
+            <a:off x="913807" y="2126944"/>
+            <a:ext cx="10355327" cy="2511835"/>
           </a:xfrm>
         </p:spPr>
         <p:txBody>
@@ -1377,8 +1377,8 @@
         </p:nvSpPr>
         <p:spPr>
           <a:xfrm>
-            <a:off x="685346" y="4650556"/>
-            <a:ext cx="7765322" cy="1140644"/>
+            <a:off x="913795" y="4650556"/>
+            <a:ext cx="10353763" cy="1140644"/>
           </a:xfrm>
         </p:spPr>
         <p:txBody>
@@ -1447,7 +1447,7 @@
           <a:p>
             <a:fld id="{8EE831F1-ED05-4BAA-8C74-2BAAB7F343BB}" type="datetimeFigureOut">
               <a:rPr lang="pt-BR" smtClean="0"/>
-              <a:t>17/06/2017</a:t>
+              <a:t>19/06/2017</a:t>
             </a:fld>
             <a:endParaRPr lang="pt-BR"/>
           </a:p>
@@ -1489,7 +1489,7 @@
           <a:p>
             <a:fld id="{EF5993D9-3239-4E1A-B177-3A3DADB6A390}" type="slidenum">
               <a:rPr lang="pt-BR" smtClean="0"/>
-              <a:t>‹#›</a:t>
+              <a:t>‹nº›</a:t>
             </a:fld>
             <a:endParaRPr lang="pt-BR"/>
           </a:p>
@@ -1537,8 +1537,8 @@
         </p:nvSpPr>
         <p:spPr>
           <a:xfrm>
-            <a:off x="685345" y="609601"/>
-            <a:ext cx="7765322" cy="1325563"/>
+            <a:off x="913793" y="609602"/>
+            <a:ext cx="10353763" cy="1325563"/>
           </a:xfrm>
         </p:spPr>
         <p:txBody>
@@ -1565,8 +1565,8 @@
         </p:nvSpPr>
         <p:spPr>
           <a:xfrm>
-            <a:off x="685346" y="2088320"/>
-            <a:ext cx="2474217" cy="823305"/>
+            <a:off x="913795" y="2088321"/>
+            <a:ext cx="3298956" cy="823305"/>
           </a:xfrm>
         </p:spPr>
         <p:txBody>
@@ -1639,8 +1639,8 @@
         </p:nvSpPr>
         <p:spPr>
           <a:xfrm>
-            <a:off x="685346" y="2911624"/>
-            <a:ext cx="2474217" cy="2879576"/>
+            <a:off x="913795" y="2911624"/>
+            <a:ext cx="3298956" cy="2879576"/>
           </a:xfrm>
         </p:spPr>
         <p:txBody>
@@ -1706,8 +1706,8 @@
         </p:nvSpPr>
         <p:spPr>
           <a:xfrm>
-            <a:off x="3333658" y="2088320"/>
-            <a:ext cx="2473919" cy="823304"/>
+            <a:off x="4444878" y="2088320"/>
+            <a:ext cx="3298559" cy="823304"/>
           </a:xfrm>
         </p:spPr>
         <p:txBody>
@@ -1780,8 +1780,8 @@
         </p:nvSpPr>
         <p:spPr>
           <a:xfrm>
-            <a:off x="3333659" y="2911624"/>
-            <a:ext cx="2474866" cy="2879576"/>
+            <a:off x="4444879" y="2911624"/>
+            <a:ext cx="3299821" cy="2879576"/>
           </a:xfrm>
         </p:spPr>
         <p:txBody>
@@ -1847,8 +1847,8 @@
         </p:nvSpPr>
         <p:spPr>
           <a:xfrm>
-            <a:off x="5979974" y="2088320"/>
-            <a:ext cx="2468408" cy="823304"/>
+            <a:off x="7973299" y="2088320"/>
+            <a:ext cx="3291211" cy="823304"/>
           </a:xfrm>
         </p:spPr>
         <p:txBody>
@@ -1921,8 +1921,8 @@
         </p:nvSpPr>
         <p:spPr>
           <a:xfrm>
-            <a:off x="5982260" y="2911624"/>
-            <a:ext cx="2468408" cy="2879576"/>
+            <a:off x="7976347" y="2911624"/>
+            <a:ext cx="3291211" cy="2879576"/>
           </a:xfrm>
         </p:spPr>
         <p:txBody>
@@ -1993,7 +1993,7 @@
           <a:p>
             <a:fld id="{8EE831F1-ED05-4BAA-8C74-2BAAB7F343BB}" type="datetimeFigureOut">
               <a:rPr lang="pt-BR" smtClean="0"/>
-              <a:t>17/06/2017</a:t>
+              <a:t>19/06/2017</a:t>
             </a:fld>
             <a:endParaRPr lang="pt-BR"/>
           </a:p>
@@ -2035,7 +2035,7 @@
           <a:p>
             <a:fld id="{EF5993D9-3239-4E1A-B177-3A3DADB6A390}" type="slidenum">
               <a:rPr lang="pt-BR" smtClean="0"/>
-              <a:t>‹#›</a:t>
+              <a:t>‹nº›</a:t>
             </a:fld>
             <a:endParaRPr lang="pt-BR"/>
           </a:p>
@@ -2083,8 +2083,8 @@
         </p:nvSpPr>
         <p:spPr>
           <a:xfrm>
-            <a:off x="685346" y="609601"/>
-            <a:ext cx="7765322" cy="1325563"/>
+            <a:off x="913795" y="609602"/>
+            <a:ext cx="10353763" cy="1325563"/>
           </a:xfrm>
         </p:spPr>
         <p:txBody>
@@ -2111,8 +2111,8 @@
         </p:nvSpPr>
         <p:spPr>
           <a:xfrm>
-            <a:off x="685347" y="3989147"/>
-            <a:ext cx="2474216" cy="576262"/>
+            <a:off x="913796" y="3989147"/>
+            <a:ext cx="3298955" cy="576262"/>
           </a:xfrm>
         </p:spPr>
         <p:txBody>
@@ -2185,8 +2185,8 @@
         </p:nvSpPr>
         <p:spPr>
           <a:xfrm>
-            <a:off x="819015" y="2092235"/>
-            <a:ext cx="2205038" cy="1524000"/>
+            <a:off x="1092020" y="2092235"/>
+            <a:ext cx="2940051" cy="1524000"/>
           </a:xfrm>
           <a:prstGeom prst="roundRect">
             <a:avLst>
@@ -2283,8 +2283,8 @@
         </p:nvSpPr>
         <p:spPr>
           <a:xfrm>
-            <a:off x="685347" y="4565409"/>
-            <a:ext cx="2474216" cy="1225792"/>
+            <a:off x="913796" y="4565409"/>
+            <a:ext cx="3298955" cy="1225792"/>
           </a:xfrm>
         </p:spPr>
         <p:txBody>
@@ -2350,8 +2350,8 @@
         </p:nvSpPr>
         <p:spPr>
           <a:xfrm>
-            <a:off x="3332026" y="3989147"/>
-            <a:ext cx="2474237" cy="576262"/>
+            <a:off x="4442702" y="3989147"/>
+            <a:ext cx="3298983" cy="576262"/>
           </a:xfrm>
         </p:spPr>
         <p:txBody>
@@ -2424,8 +2424,8 @@
         </p:nvSpPr>
         <p:spPr>
           <a:xfrm>
-            <a:off x="3426747" y="2092235"/>
-            <a:ext cx="2197894" cy="1524000"/>
+            <a:off x="4568996" y="2092235"/>
+            <a:ext cx="2930525" cy="1524000"/>
           </a:xfrm>
           <a:prstGeom prst="roundRect">
             <a:avLst>
@@ -2522,8 +2522,8 @@
         </p:nvSpPr>
         <p:spPr>
           <a:xfrm>
-            <a:off x="3331011" y="4565408"/>
-            <a:ext cx="2475252" cy="1225792"/>
+            <a:off x="4441348" y="4565408"/>
+            <a:ext cx="3300336" cy="1225792"/>
           </a:xfrm>
         </p:spPr>
         <p:txBody>
@@ -2589,8 +2589,8 @@
         </p:nvSpPr>
         <p:spPr>
           <a:xfrm>
-            <a:off x="5980067" y="3989147"/>
-            <a:ext cx="2467425" cy="576262"/>
+            <a:off x="7973423" y="3989147"/>
+            <a:ext cx="3289900" cy="576262"/>
           </a:xfrm>
         </p:spPr>
         <p:txBody>
@@ -2663,8 +2663,8 @@
         </p:nvSpPr>
         <p:spPr>
           <a:xfrm>
-            <a:off x="6114603" y="2092235"/>
-            <a:ext cx="2199085" cy="1524000"/>
+            <a:off x="8152805" y="2092235"/>
+            <a:ext cx="2932113" cy="1524000"/>
           </a:xfrm>
           <a:prstGeom prst="roundRect">
             <a:avLst>
@@ -2761,8 +2761,8 @@
         </p:nvSpPr>
         <p:spPr>
           <a:xfrm>
-            <a:off x="5979973" y="4565410"/>
-            <a:ext cx="2470694" cy="1225790"/>
+            <a:off x="7973297" y="4565410"/>
+            <a:ext cx="3294259" cy="1225790"/>
           </a:xfrm>
         </p:spPr>
         <p:txBody>
@@ -2833,7 +2833,7 @@
           <a:p>
             <a:fld id="{8EE831F1-ED05-4BAA-8C74-2BAAB7F343BB}" type="datetimeFigureOut">
               <a:rPr lang="pt-BR" smtClean="0"/>
-              <a:t>17/06/2017</a:t>
+              <a:t>19/06/2017</a:t>
             </a:fld>
             <a:endParaRPr lang="pt-BR"/>
           </a:p>
@@ -2875,7 +2875,7 @@
           <a:p>
             <a:fld id="{EF5993D9-3239-4E1A-B177-3A3DADB6A390}" type="slidenum">
               <a:rPr lang="pt-BR" smtClean="0"/>
-              <a:t>‹#›</a:t>
+              <a:t>‹nº›</a:t>
             </a:fld>
             <a:endParaRPr lang="pt-BR"/>
           </a:p>
@@ -3003,7 +3003,7 @@
           <a:p>
             <a:fld id="{8EE831F1-ED05-4BAA-8C74-2BAAB7F343BB}" type="datetimeFigureOut">
               <a:rPr lang="pt-BR" smtClean="0"/>
-              <a:t>17/06/2017</a:t>
+              <a:t>19/06/2017</a:t>
             </a:fld>
             <a:endParaRPr lang="pt-BR"/>
           </a:p>
@@ -3045,7 +3045,7 @@
           <a:p>
             <a:fld id="{EF5993D9-3239-4E1A-B177-3A3DADB6A390}" type="slidenum">
               <a:rPr lang="pt-BR" smtClean="0"/>
-              <a:t>‹#›</a:t>
+              <a:t>‹nº›</a:t>
             </a:fld>
             <a:endParaRPr lang="pt-BR"/>
           </a:p>
@@ -3093,8 +3093,8 @@
         </p:nvSpPr>
         <p:spPr>
           <a:xfrm>
-            <a:off x="6543675" y="609600"/>
-            <a:ext cx="1906993" cy="5181601"/>
+            <a:off x="8724901" y="609601"/>
+            <a:ext cx="2542657" cy="5181601"/>
           </a:xfrm>
         </p:spPr>
         <p:txBody>
@@ -3125,8 +3125,8 @@
         </p:nvSpPr>
         <p:spPr>
           <a:xfrm>
-            <a:off x="685346" y="609600"/>
-            <a:ext cx="5744029" cy="5181601"/>
+            <a:off x="913796" y="609601"/>
+            <a:ext cx="7658705" cy="5181601"/>
           </a:xfrm>
         </p:spPr>
         <p:txBody>
@@ -3187,7 +3187,7 @@
           <a:p>
             <a:fld id="{8EE831F1-ED05-4BAA-8C74-2BAAB7F343BB}" type="datetimeFigureOut">
               <a:rPr lang="pt-BR" smtClean="0"/>
-              <a:t>17/06/2017</a:t>
+              <a:t>19/06/2017</a:t>
             </a:fld>
             <a:endParaRPr lang="pt-BR"/>
           </a:p>
@@ -3229,7 +3229,7 @@
           <a:p>
             <a:fld id="{EF5993D9-3239-4E1A-B177-3A3DADB6A390}" type="slidenum">
               <a:rPr lang="pt-BR" smtClean="0"/>
-              <a:t>‹#›</a:t>
+              <a:t>‹nº›</a:t>
             </a:fld>
             <a:endParaRPr lang="pt-BR"/>
           </a:p>
@@ -3357,7 +3357,7 @@
           <a:p>
             <a:fld id="{8EE831F1-ED05-4BAA-8C74-2BAAB7F343BB}" type="datetimeFigureOut">
               <a:rPr lang="pt-BR" smtClean="0"/>
-              <a:t>17/06/2017</a:t>
+              <a:t>19/06/2017</a:t>
             </a:fld>
             <a:endParaRPr lang="pt-BR"/>
           </a:p>
@@ -3399,7 +3399,7 @@
           <a:p>
             <a:fld id="{EF5993D9-3239-4E1A-B177-3A3DADB6A390}" type="slidenum">
               <a:rPr lang="pt-BR" smtClean="0"/>
-              <a:t>‹#›</a:t>
+              <a:t>‹nº›</a:t>
             </a:fld>
             <a:endParaRPr lang="pt-BR"/>
           </a:p>
@@ -3447,8 +3447,8 @@
         </p:nvSpPr>
         <p:spPr>
           <a:xfrm>
-            <a:off x="921933" y="657227"/>
-            <a:ext cx="7300134" cy="2852737"/>
+            <a:off x="1229244" y="657228"/>
+            <a:ext cx="9733512" cy="2852737"/>
           </a:xfrm>
         </p:spPr>
         <p:txBody>
@@ -3481,8 +3481,8 @@
         </p:nvSpPr>
         <p:spPr>
           <a:xfrm>
-            <a:off x="921933" y="3602039"/>
-            <a:ext cx="7300134" cy="1500187"/>
+            <a:off x="1229244" y="3602040"/>
+            <a:ext cx="9733512" cy="1500187"/>
           </a:xfrm>
         </p:spPr>
         <p:txBody>
@@ -3605,7 +3605,7 @@
           <a:p>
             <a:fld id="{8EE831F1-ED05-4BAA-8C74-2BAAB7F343BB}" type="datetimeFigureOut">
               <a:rPr lang="pt-BR" smtClean="0"/>
-              <a:t>17/06/2017</a:t>
+              <a:t>19/06/2017</a:t>
             </a:fld>
             <a:endParaRPr lang="pt-BR"/>
           </a:p>
@@ -3647,7 +3647,7 @@
           <a:p>
             <a:fld id="{EF5993D9-3239-4E1A-B177-3A3DADB6A390}" type="slidenum">
               <a:rPr lang="pt-BR" smtClean="0"/>
-              <a:t>‹#›</a:t>
+              <a:t>‹nº›</a:t>
             </a:fld>
             <a:endParaRPr lang="pt-BR"/>
           </a:p>
@@ -3695,8 +3695,8 @@
         </p:nvSpPr>
         <p:spPr>
           <a:xfrm>
-            <a:off x="685347" y="609601"/>
-            <a:ext cx="7765321" cy="1326321"/>
+            <a:off x="913797" y="609602"/>
+            <a:ext cx="10353761" cy="1326321"/>
           </a:xfrm>
         </p:spPr>
         <p:txBody>
@@ -3723,8 +3723,8 @@
         </p:nvSpPr>
         <p:spPr>
           <a:xfrm>
-            <a:off x="685346" y="2088320"/>
-            <a:ext cx="3829503" cy="3702881"/>
+            <a:off x="913795" y="2088321"/>
+            <a:ext cx="5106004" cy="3702881"/>
           </a:xfrm>
         </p:spPr>
         <p:txBody>
@@ -3780,8 +3780,8 @@
         </p:nvSpPr>
         <p:spPr>
           <a:xfrm>
-            <a:off x="4630052" y="2088320"/>
-            <a:ext cx="3820616" cy="3702881"/>
+            <a:off x="6173403" y="2088321"/>
+            <a:ext cx="5094155" cy="3702881"/>
           </a:xfrm>
         </p:spPr>
         <p:txBody>
@@ -3842,7 +3842,7 @@
           <a:p>
             <a:fld id="{8EE831F1-ED05-4BAA-8C74-2BAAB7F343BB}" type="datetimeFigureOut">
               <a:rPr lang="pt-BR" smtClean="0"/>
-              <a:t>17/06/2017</a:t>
+              <a:t>19/06/2017</a:t>
             </a:fld>
             <a:endParaRPr lang="pt-BR"/>
           </a:p>
@@ -3884,7 +3884,7 @@
           <a:p>
             <a:fld id="{EF5993D9-3239-4E1A-B177-3A3DADB6A390}" type="slidenum">
               <a:rPr lang="pt-BR" smtClean="0"/>
-              <a:t>‹#›</a:t>
+              <a:t>‹nº›</a:t>
             </a:fld>
             <a:endParaRPr lang="pt-BR"/>
           </a:p>
@@ -3932,8 +3932,8 @@
         </p:nvSpPr>
         <p:spPr>
           <a:xfrm>
-            <a:off x="685347" y="609601"/>
-            <a:ext cx="7765321" cy="1325563"/>
+            <a:off x="913797" y="609602"/>
+            <a:ext cx="10353761" cy="1325563"/>
           </a:xfrm>
         </p:spPr>
         <p:txBody>
@@ -3960,8 +3960,8 @@
         </p:nvSpPr>
         <p:spPr>
           <a:xfrm>
-            <a:off x="915427" y="2088320"/>
-            <a:ext cx="3600326" cy="823912"/>
+            <a:off x="1220569" y="2088320"/>
+            <a:ext cx="4800435" cy="823912"/>
           </a:xfrm>
         </p:spPr>
         <p:txBody>
@@ -4028,8 +4028,8 @@
         </p:nvSpPr>
         <p:spPr>
           <a:xfrm>
-            <a:off x="685346" y="2912232"/>
-            <a:ext cx="3830406" cy="2878968"/>
+            <a:off x="913795" y="2912232"/>
+            <a:ext cx="5107208" cy="2878968"/>
           </a:xfrm>
         </p:spPr>
         <p:txBody>
@@ -4085,8 +4085,8 @@
         </p:nvSpPr>
         <p:spPr>
           <a:xfrm>
-            <a:off x="4859230" y="2088320"/>
-            <a:ext cx="3591437" cy="823912"/>
+            <a:off x="6478974" y="2088320"/>
+            <a:ext cx="4788583" cy="823912"/>
           </a:xfrm>
         </p:spPr>
         <p:txBody>
@@ -4153,8 +4153,8 @@
         </p:nvSpPr>
         <p:spPr>
           <a:xfrm>
-            <a:off x="4629150" y="2912232"/>
-            <a:ext cx="3821518" cy="2878968"/>
+            <a:off x="6172200" y="2912232"/>
+            <a:ext cx="5095357" cy="2878968"/>
           </a:xfrm>
         </p:spPr>
         <p:txBody>
@@ -4215,7 +4215,7 @@
           <a:p>
             <a:fld id="{8EE831F1-ED05-4BAA-8C74-2BAAB7F343BB}" type="datetimeFigureOut">
               <a:rPr lang="pt-BR" smtClean="0"/>
-              <a:t>17/06/2017</a:t>
+              <a:t>19/06/2017</a:t>
             </a:fld>
             <a:endParaRPr lang="pt-BR"/>
           </a:p>
@@ -4257,7 +4257,7 @@
           <a:p>
             <a:fld id="{EF5993D9-3239-4E1A-B177-3A3DADB6A390}" type="slidenum">
               <a:rPr lang="pt-BR" smtClean="0"/>
-              <a:t>‹#›</a:t>
+              <a:t>‹nº›</a:t>
             </a:fld>
             <a:endParaRPr lang="pt-BR"/>
           </a:p>
@@ -4333,7 +4333,7 @@
           <a:p>
             <a:fld id="{8EE831F1-ED05-4BAA-8C74-2BAAB7F343BB}" type="datetimeFigureOut">
               <a:rPr lang="pt-BR" smtClean="0"/>
-              <a:t>17/06/2017</a:t>
+              <a:t>19/06/2017</a:t>
             </a:fld>
             <a:endParaRPr lang="pt-BR"/>
           </a:p>
@@ -4375,7 +4375,7 @@
           <a:p>
             <a:fld id="{EF5993D9-3239-4E1A-B177-3A3DADB6A390}" type="slidenum">
               <a:rPr lang="pt-BR" smtClean="0"/>
-              <a:t>‹#›</a:t>
+              <a:t>‹nº›</a:t>
             </a:fld>
             <a:endParaRPr lang="pt-BR"/>
           </a:p>
@@ -4428,7 +4428,7 @@
           <a:p>
             <a:fld id="{8EE831F1-ED05-4BAA-8C74-2BAAB7F343BB}" type="datetimeFigureOut">
               <a:rPr lang="pt-BR" smtClean="0"/>
-              <a:t>17/06/2017</a:t>
+              <a:t>19/06/2017</a:t>
             </a:fld>
             <a:endParaRPr lang="pt-BR"/>
           </a:p>
@@ -4470,7 +4470,7 @@
           <a:p>
             <a:fld id="{EF5993D9-3239-4E1A-B177-3A3DADB6A390}" type="slidenum">
               <a:rPr lang="pt-BR" smtClean="0"/>
-              <a:t>‹#›</a:t>
+              <a:t>‹nº›</a:t>
             </a:fld>
             <a:endParaRPr lang="pt-BR"/>
           </a:p>
@@ -4518,8 +4518,8 @@
         </p:nvSpPr>
         <p:spPr>
           <a:xfrm>
-            <a:off x="687921" y="609600"/>
-            <a:ext cx="2949178" cy="2362200"/>
+            <a:off x="917228" y="609600"/>
+            <a:ext cx="3932237" cy="2362200"/>
           </a:xfrm>
         </p:spPr>
         <p:txBody>
@@ -4552,8 +4552,8 @@
         </p:nvSpPr>
         <p:spPr>
           <a:xfrm>
-            <a:off x="3808548" y="609600"/>
-            <a:ext cx="4642119" cy="5181600"/>
+            <a:off x="5078065" y="609600"/>
+            <a:ext cx="6189492" cy="5181600"/>
           </a:xfrm>
         </p:spPr>
         <p:txBody>
@@ -4609,8 +4609,8 @@
         </p:nvSpPr>
         <p:spPr>
           <a:xfrm>
-            <a:off x="687921" y="2971801"/>
-            <a:ext cx="2949178" cy="2819399"/>
+            <a:off x="917228" y="2971802"/>
+            <a:ext cx="3932237" cy="2819399"/>
           </a:xfrm>
         </p:spPr>
         <p:txBody>
@@ -4679,7 +4679,7 @@
           <a:p>
             <a:fld id="{8EE831F1-ED05-4BAA-8C74-2BAAB7F343BB}" type="datetimeFigureOut">
               <a:rPr lang="pt-BR" smtClean="0"/>
-              <a:t>17/06/2017</a:t>
+              <a:t>19/06/2017</a:t>
             </a:fld>
             <a:endParaRPr lang="pt-BR"/>
           </a:p>
@@ -4721,7 +4721,7 @@
           <a:p>
             <a:fld id="{EF5993D9-3239-4E1A-B177-3A3DADB6A390}" type="slidenum">
               <a:rPr lang="pt-BR" smtClean="0"/>
-              <a:t>‹#›</a:t>
+              <a:t>‹nº›</a:t>
             </a:fld>
             <a:endParaRPr lang="pt-BR"/>
           </a:p>
@@ -4769,8 +4769,8 @@
         </p:nvSpPr>
         <p:spPr>
           <a:xfrm>
-            <a:off x="687921" y="609600"/>
-            <a:ext cx="4167603" cy="2362200"/>
+            <a:off x="917229" y="609600"/>
+            <a:ext cx="5556804" cy="2362200"/>
           </a:xfrm>
         </p:spPr>
         <p:txBody>
@@ -4803,8 +4803,8 @@
         </p:nvSpPr>
         <p:spPr>
           <a:xfrm>
-            <a:off x="5249932" y="758881"/>
-            <a:ext cx="2966938" cy="4883038"/>
+            <a:off x="6999910" y="758881"/>
+            <a:ext cx="3955917" cy="4883038"/>
           </a:xfrm>
           <a:noFill/>
           <a:ln w="190500" cap="sq">
@@ -4894,8 +4894,8 @@
         </p:nvSpPr>
         <p:spPr>
           <a:xfrm>
-            <a:off x="685346" y="2971800"/>
-            <a:ext cx="4171242" cy="2819400"/>
+            <a:off x="913795" y="2971800"/>
+            <a:ext cx="5561656" cy="2819400"/>
           </a:xfrm>
         </p:spPr>
         <p:txBody>
@@ -4966,7 +4966,7 @@
           <a:p>
             <a:fld id="{8EE831F1-ED05-4BAA-8C74-2BAAB7F343BB}" type="datetimeFigureOut">
               <a:rPr lang="pt-BR" smtClean="0"/>
-              <a:t>17/06/2017</a:t>
+              <a:t>19/06/2017</a:t>
             </a:fld>
             <a:endParaRPr lang="pt-BR"/>
           </a:p>
@@ -5008,7 +5008,7 @@
           <a:p>
             <a:fld id="{EF5993D9-3239-4E1A-B177-3A3DADB6A390}" type="slidenum">
               <a:rPr lang="pt-BR" smtClean="0"/>
-              <a:t>‹#›</a:t>
+              <a:t>‹nº›</a:t>
             </a:fld>
             <a:endParaRPr lang="pt-BR"/>
           </a:p>
@@ -5061,8 +5061,8 @@
         </p:nvSpPr>
         <p:spPr>
           <a:xfrm>
-            <a:off x="685347" y="609601"/>
-            <a:ext cx="7765321" cy="1326321"/>
+            <a:off x="913797" y="609602"/>
+            <a:ext cx="10353761" cy="1326321"/>
           </a:xfrm>
           <a:prstGeom prst="rect">
             <a:avLst/>
@@ -5094,8 +5094,8 @@
         </p:nvSpPr>
         <p:spPr>
           <a:xfrm>
-            <a:off x="685346" y="2096064"/>
-            <a:ext cx="7765322" cy="3695136"/>
+            <a:off x="913795" y="2096064"/>
+            <a:ext cx="10353763" cy="3695136"/>
           </a:xfrm>
           <a:prstGeom prst="rect">
             <a:avLst/>
@@ -5156,8 +5156,8 @@
         </p:nvSpPr>
         <p:spPr>
           <a:xfrm>
-            <a:off x="5759052" y="5883276"/>
-            <a:ext cx="2057400" cy="365125"/>
+            <a:off x="7678736" y="5883277"/>
+            <a:ext cx="2743200" cy="365125"/>
           </a:xfrm>
           <a:prstGeom prst="rect">
             <a:avLst/>
@@ -5179,7 +5179,7 @@
           <a:p>
             <a:fld id="{8EE831F1-ED05-4BAA-8C74-2BAAB7F343BB}" type="datetimeFigureOut">
               <a:rPr lang="pt-BR" smtClean="0"/>
-              <a:t>17/06/2017</a:t>
+              <a:t>19/06/2017</a:t>
             </a:fld>
             <a:endParaRPr lang="pt-BR"/>
           </a:p>
@@ -5197,8 +5197,8 @@
         </p:nvSpPr>
         <p:spPr>
           <a:xfrm>
-            <a:off x="685346" y="5883276"/>
-            <a:ext cx="5004649" cy="365125"/>
+            <a:off x="913796" y="5883277"/>
+            <a:ext cx="6672865" cy="365125"/>
           </a:xfrm>
           <a:prstGeom prst="rect">
             <a:avLst/>
@@ -5234,8 +5234,8 @@
         </p:nvSpPr>
         <p:spPr>
           <a:xfrm>
-            <a:off x="7885509" y="5883276"/>
-            <a:ext cx="565159" cy="365125"/>
+            <a:off x="10514013" y="5883277"/>
+            <a:ext cx="753545" cy="365125"/>
           </a:xfrm>
           <a:prstGeom prst="rect">
             <a:avLst/>
@@ -5257,7 +5257,7 @@
           <a:p>
             <a:fld id="{EF5993D9-3239-4E1A-B177-3A3DADB6A390}" type="slidenum">
               <a:rPr lang="pt-BR" smtClean="0"/>
-              <a:t>‹#›</a:t>
+              <a:t>‹nº›</a:t>
             </a:fld>
             <a:endParaRPr lang="pt-BR"/>
           </a:p>
@@ -5672,7 +5672,7 @@
         </p:nvSpPr>
         <p:spPr>
           <a:xfrm>
-            <a:off x="0" y="548680"/>
+            <a:off x="1524000" y="534167"/>
             <a:ext cx="9144000" cy="1019199"/>
           </a:xfrm>
         </p:spPr>
@@ -5681,7 +5681,7 @@
           <a:lstStyle/>
           <a:p>
             <a:r>
-              <a:rPr lang="pt-BR" sz="3200" dirty="0" smtClean="0"/>
+              <a:rPr lang="pt-BR" sz="3200" dirty="0"/>
               <a:t>Fundamentos da Gestão</a:t>
             </a:r>
             <a:endParaRPr lang="pt-BR" sz="3200" dirty="0"/>
@@ -5700,7 +5700,7 @@
         </p:nvSpPr>
         <p:spPr>
           <a:xfrm>
-            <a:off x="0" y="3140968"/>
+            <a:off x="1524000" y="3140968"/>
             <a:ext cx="9144000" cy="1584176"/>
           </a:xfrm>
         </p:spPr>
@@ -5818,7 +5818,7 @@
         </p:nvSpPr>
         <p:spPr>
           <a:xfrm>
-            <a:off x="0" y="1700808"/>
+            <a:off x="1524000" y="1700808"/>
             <a:ext cx="9144000" cy="1080120"/>
           </a:xfrm>
           <a:prstGeom prst="rect">
@@ -5862,9 +5862,32 @@
                   <a:srgbClr val="FFC000"/>
                 </a:solidFill>
               </a:rPr>
-              <a:t>Empresa: ANS Sistemas</a:t>
-            </a:r>
-            <a:endParaRPr lang="pt-BR" sz="3200" dirty="0">
+              <a:t>Empresa:</a:t>
+            </a:r>
+            <a:br>
+              <a:rPr lang="pt-BR" sz="3200" dirty="0" smtClean="0">
+                <a:solidFill>
+                  <a:srgbClr val="FFC000"/>
+                </a:solidFill>
+              </a:rPr>
+            </a:br>
+            <a:r>
+              <a:rPr lang="pt-BR" sz="3200" b="1" dirty="0" smtClean="0">
+                <a:solidFill>
+                  <a:srgbClr val="FFC000"/>
+                </a:solidFill>
+              </a:rPr>
+              <a:t>ANS </a:t>
+            </a:r>
+            <a:r>
+              <a:rPr lang="pt-BR" sz="3200" b="1" dirty="0">
+                <a:solidFill>
+                  <a:srgbClr val="FFC000"/>
+                </a:solidFill>
+              </a:rPr>
+              <a:t>Sistemas</a:t>
+            </a:r>
+            <a:endParaRPr lang="pt-BR" sz="3200" b="1" dirty="0">
               <a:solidFill>
                 <a:srgbClr val="FFC000"/>
               </a:solidFill>
@@ -5921,7 +5944,7 @@
         </p:nvSpPr>
         <p:spPr>
           <a:xfrm>
-            <a:off x="395536" y="404664"/>
+            <a:off x="1919536" y="404664"/>
             <a:ext cx="8229600" cy="1600200"/>
           </a:xfrm>
         </p:spPr>
@@ -5949,8 +5972,8 @@
         </p:nvSpPr>
         <p:spPr>
           <a:xfrm>
-            <a:off x="611560" y="1859340"/>
-            <a:ext cx="8013576" cy="3970318"/>
+            <a:off x="1271464" y="1859340"/>
+            <a:ext cx="10153128" cy="3108543"/>
           </a:xfrm>
           <a:prstGeom prst="rect">
             <a:avLst/>
@@ -5978,10 +6001,40 @@
               <a:t>Clínicas Médicas </a:t>
             </a:r>
             <a:r>
+              <a:rPr lang="pt-BR" sz="2800" dirty="0" smtClean="0">
+                <a:latin typeface="Arial" panose="020B0604020202020204" pitchFamily="34" charset="0"/>
+              </a:rPr>
+              <a:t>e </a:t>
+            </a:r>
+            <a:r>
+              <a:rPr lang="pt-BR" sz="2800" dirty="0" smtClean="0">
+                <a:solidFill>
+                  <a:srgbClr val="FFC000"/>
+                </a:solidFill>
+                <a:latin typeface="Arial" panose="020B0604020202020204" pitchFamily="34" charset="0"/>
+              </a:rPr>
+              <a:t>Odontológicas</a:t>
+            </a:r>
+            <a:r>
+              <a:rPr lang="pt-BR" sz="2800" dirty="0" smtClean="0">
+                <a:latin typeface="Arial" panose="020B0604020202020204" pitchFamily="34" charset="0"/>
+              </a:rPr>
+              <a:t>, </a:t>
+            </a:r>
+            <a:r>
+              <a:rPr lang="pt-BR" sz="2800" dirty="0" smtClean="0">
+                <a:solidFill>
+                  <a:srgbClr val="FFC000"/>
+                </a:solidFill>
+                <a:latin typeface="Arial" panose="020B0604020202020204" pitchFamily="34" charset="0"/>
+              </a:rPr>
+              <a:t>Hospitais</a:t>
+            </a:r>
+            <a:r>
               <a:rPr lang="pt-BR" sz="2800" dirty="0">
                 <a:latin typeface="Arial" panose="020B0604020202020204" pitchFamily="34" charset="0"/>
               </a:rPr>
-              <a:t>e </a:t>
+              <a:t>, </a:t>
             </a:r>
             <a:r>
               <a:rPr lang="pt-BR" sz="2800" dirty="0">
@@ -5990,13 +6043,63 @@
                 </a:solidFill>
                 <a:latin typeface="Arial" panose="020B0604020202020204" pitchFamily="34" charset="0"/>
               </a:rPr>
-              <a:t>Odontológicas</a:t>
+              <a:t>Operadoras de Planos </a:t>
+            </a:r>
+            <a:r>
+              <a:rPr lang="pt-BR" sz="2800" dirty="0" smtClean="0">
+                <a:solidFill>
+                  <a:srgbClr val="FFC000"/>
+                </a:solidFill>
+                <a:latin typeface="Arial" panose="020B0604020202020204" pitchFamily="34" charset="0"/>
+              </a:rPr>
+              <a:t>de Saúde</a:t>
+            </a:r>
+            <a:r>
+              <a:rPr lang="pt-BR" sz="2800" dirty="0" smtClean="0">
+                <a:latin typeface="Arial" panose="020B0604020202020204" pitchFamily="34" charset="0"/>
+              </a:rPr>
+              <a:t>,</a:t>
+            </a:r>
+            <a:r>
+              <a:rPr lang="pt-BR" sz="2800" dirty="0">
+                <a:solidFill>
+                  <a:srgbClr val="FFC000"/>
+                </a:solidFill>
+                <a:latin typeface="Arial" panose="020B0604020202020204" pitchFamily="34" charset="0"/>
+              </a:rPr>
+              <a:t/>
+            </a:r>
+            <a:br>
+              <a:rPr lang="pt-BR" sz="2800" dirty="0">
+                <a:solidFill>
+                  <a:srgbClr val="FFC000"/>
+                </a:solidFill>
+                <a:latin typeface="Arial" panose="020B0604020202020204" pitchFamily="34" charset="0"/>
+              </a:rPr>
+            </a:br>
+            <a:r>
+              <a:rPr lang="pt-BR" sz="2800" dirty="0" smtClean="0">
+                <a:solidFill>
+                  <a:srgbClr val="FFC000"/>
+                </a:solidFill>
+                <a:latin typeface="Arial" panose="020B0604020202020204" pitchFamily="34" charset="0"/>
+              </a:rPr>
+              <a:t>Laboratórios</a:t>
+            </a:r>
+            <a:r>
+              <a:rPr lang="pt-BR" sz="2800" dirty="0">
+                <a:solidFill>
+                  <a:srgbClr val="FFC000"/>
+                </a:solidFill>
+                <a:latin typeface="Arial" panose="020B0604020202020204" pitchFamily="34" charset="0"/>
+              </a:rPr>
+              <a:t> de Análises Clínicas </a:t>
             </a:r>
             <a:r>
               <a:rPr lang="pt-BR" sz="2800" dirty="0">
                 <a:latin typeface="Arial" panose="020B0604020202020204" pitchFamily="34" charset="0"/>
               </a:rPr>
-              <a:t>, </a:t>
+              <a:t>e </a:t>
             </a:r>
             <a:r>
               <a:rPr lang="pt-BR" sz="2800" dirty="0">
@@ -6005,70 +6108,28 @@
                 </a:solidFill>
                 <a:latin typeface="Arial" panose="020B0604020202020204" pitchFamily="34" charset="0"/>
               </a:rPr>
-              <a:t>Hospitais</a:t>
+              <a:t>empresas de </a:t>
+            </a:r>
+            <a:r>
+              <a:rPr lang="pt-BR" sz="2800" dirty="0">
+                <a:solidFill>
+                  <a:srgbClr val="FFC000"/>
+                </a:solidFill>
+                <a:latin typeface="Arial" panose="020B0604020202020204" pitchFamily="34" charset="0"/>
+              </a:rPr>
+              <a:t>e-commerce</a:t>
             </a:r>
             <a:r>
               <a:rPr lang="pt-BR" sz="2800" dirty="0">
                 <a:latin typeface="Arial" panose="020B0604020202020204" pitchFamily="34" charset="0"/>
               </a:rPr>
-              <a:t>, </a:t>
-            </a:r>
-            <a:r>
-              <a:rPr lang="pt-BR" sz="2800" dirty="0">
-                <a:solidFill>
-                  <a:srgbClr val="FFC000"/>
-                </a:solidFill>
-                <a:latin typeface="Arial" panose="020B0604020202020204" pitchFamily="34" charset="0"/>
-              </a:rPr>
-              <a:t>Operadoras de Planos de Saúde</a:t>
+              <a:t>. Além </a:t>
             </a:r>
             <a:r>
               <a:rPr lang="pt-BR" sz="2800" dirty="0">
                 <a:latin typeface="Arial" panose="020B0604020202020204" pitchFamily="34" charset="0"/>
               </a:rPr>
-              <a:t>,</a:t>
-            </a:r>
-            <a:r>
-              <a:rPr lang="pt-BR" sz="2800" dirty="0">
-                <a:solidFill>
-                  <a:srgbClr val="FFC000"/>
-                </a:solidFill>
-                <a:latin typeface="Arial" panose="020B0604020202020204" pitchFamily="34" charset="0"/>
-              </a:rPr>
-              <a:t> Laboratórios de Análises Clínicas </a:t>
-            </a:r>
-            <a:r>
-              <a:rPr lang="pt-BR" sz="2800" dirty="0">
-                <a:latin typeface="Arial" panose="020B0604020202020204" pitchFamily="34" charset="0"/>
-              </a:rPr>
-              <a:t>e </a:t>
-            </a:r>
-            <a:r>
-              <a:rPr lang="pt-BR" sz="2800" dirty="0">
-                <a:solidFill>
-                  <a:srgbClr val="FFC000"/>
-                </a:solidFill>
-                <a:latin typeface="Arial" panose="020B0604020202020204" pitchFamily="34" charset="0"/>
-              </a:rPr>
-              <a:t>empresas de e-commerce</a:t>
-            </a:r>
-            <a:r>
-              <a:rPr lang="pt-BR" sz="2800" dirty="0">
-                <a:latin typeface="Arial" panose="020B0604020202020204" pitchFamily="34" charset="0"/>
-              </a:rPr>
-              <a:t>. Além dos Sites Institucionais e projetos inovadores para Dispositivos Móveis com o sistema operacional </a:t>
-            </a:r>
-            <a:r>
-              <a:rPr lang="pt-BR" sz="2800" dirty="0" err="1">
-                <a:latin typeface="Arial" panose="020B0604020202020204" pitchFamily="34" charset="0"/>
-              </a:rPr>
-              <a:t>Android</a:t>
-            </a:r>
-            <a:r>
-              <a:rPr lang="pt-BR" sz="2800" dirty="0">
-                <a:latin typeface="Arial" panose="020B0604020202020204" pitchFamily="34" charset="0"/>
-              </a:rPr>
-              <a:t>.</a:t>
+              <a:t>dos Sites Institucionais e projetos inovadores para Dispositivos Móveis com o sistema operacional Android.</a:t>
             </a:r>
           </a:p>
         </p:txBody>
@@ -6083,6 +6144,13 @@
   <p:clrMapOvr>
     <a:masterClrMapping/>
   </p:clrMapOvr>
+  <p:timing>
+    <p:tnLst>
+      <p:par>
+        <p:cTn id="1" dur="indefinite" restart="never" nodeType="tmRoot"/>
+      </p:par>
+    </p:tnLst>
+  </p:timing>
 </p:sld>
 </file>
 
@@ -6115,7 +6183,7 @@
         </p:nvSpPr>
         <p:spPr>
           <a:xfrm>
-            <a:off x="539552" y="2852936"/>
+            <a:off x="2063552" y="2852936"/>
             <a:ext cx="8229600" cy="1600200"/>
           </a:xfrm>
         </p:spPr>
@@ -6156,6 +6224,13 @@
   <p:clrMapOvr>
     <a:masterClrMapping/>
   </p:clrMapOvr>
+  <p:timing>
+    <p:tnLst>
+      <p:par>
+        <p:cTn id="1" dur="indefinite" restart="never" nodeType="tmRoot"/>
+      </p:par>
+    </p:tnLst>
+  </p:timing>
 </p:sld>
 </file>
 
@@ -6219,25 +6294,25 @@
           <a:lstStyle/>
           <a:p>
             <a:r>
-              <a:rPr lang="pt-BR" sz="2800" dirty="0" smtClean="0"/>
+              <a:rPr lang="pt-BR" sz="2800" dirty="0"/>
               <a:t>Clínicas Médicas e Odontológicas;</a:t>
             </a:r>
           </a:p>
           <a:p>
             <a:r>
-              <a:rPr lang="pt-BR" sz="2800" dirty="0" smtClean="0"/>
+              <a:rPr lang="pt-BR" sz="2800" dirty="0"/>
               <a:t>Operadoras de plano de saúde;</a:t>
             </a:r>
           </a:p>
           <a:p>
             <a:r>
-              <a:rPr lang="pt-BR" sz="2800" dirty="0" smtClean="0"/>
+              <a:rPr lang="pt-BR" sz="2800" dirty="0"/>
               <a:t>Hospitais;</a:t>
             </a:r>
           </a:p>
           <a:p>
             <a:r>
-              <a:rPr lang="pt-BR" sz="2800" dirty="0" smtClean="0"/>
+              <a:rPr lang="pt-BR" sz="2800" dirty="0"/>
               <a:t>Laboratórios;</a:t>
             </a:r>
           </a:p>
@@ -6256,6 +6331,13 @@
   <p:clrMapOvr>
     <a:masterClrMapping/>
   </p:clrMapOvr>
+  <p:timing>
+    <p:tnLst>
+      <p:par>
+        <p:cTn id="1" dur="indefinite" restart="never" nodeType="tmRoot"/>
+      </p:par>
+    </p:tnLst>
+  </p:timing>
 </p:sld>
 </file>
 
@@ -6288,7 +6370,7 @@
         </p:nvSpPr>
         <p:spPr>
           <a:xfrm>
-            <a:off x="539552" y="2852936"/>
+            <a:off x="2063552" y="2852936"/>
             <a:ext cx="8229600" cy="1600200"/>
           </a:xfrm>
         </p:spPr>
@@ -6322,6 +6404,13 @@
   <p:clrMapOvr>
     <a:masterClrMapping/>
   </p:clrMapOvr>
+  <p:timing>
+    <p:tnLst>
+      <p:par>
+        <p:cTn id="1" dur="indefinite" restart="never" nodeType="tmRoot"/>
+      </p:par>
+    </p:tnLst>
+  </p:timing>
 </p:sld>
 </file>
 
@@ -6354,7 +6443,7 @@
         </p:nvSpPr>
         <p:spPr>
           <a:xfrm>
-            <a:off x="323528" y="0"/>
+            <a:off x="1847528" y="0"/>
             <a:ext cx="8229600" cy="1600200"/>
           </a:xfrm>
         </p:spPr>
@@ -6382,7 +6471,7 @@
         </p:nvSpPr>
         <p:spPr>
           <a:xfrm>
-            <a:off x="539552" y="1600200"/>
+            <a:off x="1415480" y="1603829"/>
             <a:ext cx="4572000" cy="461665"/>
           </a:xfrm>
           <a:prstGeom prst="rect">
@@ -6400,7 +6489,7 @@
               <a:buChar char="•"/>
             </a:pPr>
             <a:r>
-              <a:rPr lang="pt-BR" sz="2400" b="1" dirty="0" smtClean="0">
+              <a:rPr lang="pt-BR" sz="2400" b="1" dirty="0">
                 <a:solidFill>
                   <a:schemeClr val="tx2"/>
                 </a:solidFill>
@@ -6425,7 +6514,7 @@
         </p:nvSpPr>
         <p:spPr>
           <a:xfrm>
-            <a:off x="521474" y="2258375"/>
+            <a:off x="1397402" y="2262004"/>
             <a:ext cx="7704856" cy="1200329"/>
           </a:xfrm>
           <a:prstGeom prst="rect">
@@ -6443,7 +6532,7 @@
               <a:t>É um software de auxílio gerencial para Clínicas Médicas em geral, </a:t>
             </a:r>
             <a:r>
-              <a:rPr lang="pt-BR" sz="2400" dirty="0" smtClean="0"/>
+              <a:rPr lang="pt-BR" sz="2400" dirty="0"/>
               <a:t>Consultórios </a:t>
             </a:r>
             <a:r>
@@ -6461,7 +6550,7 @@
         </p:nvSpPr>
         <p:spPr>
           <a:xfrm>
-            <a:off x="539552" y="3600510"/>
+            <a:off x="1415480" y="3604139"/>
             <a:ext cx="4572000" cy="461665"/>
           </a:xfrm>
           <a:prstGeom prst="rect">
@@ -6479,7 +6568,7 @@
               <a:buChar char="•"/>
             </a:pPr>
             <a:r>
-              <a:rPr lang="pt-BR" sz="2400" b="1" dirty="0" smtClean="0">
+              <a:rPr lang="pt-BR" sz="2400" b="1" dirty="0">
                 <a:solidFill>
                   <a:schemeClr val="tx2"/>
                 </a:solidFill>
@@ -6504,7 +6593,7 @@
         </p:nvSpPr>
         <p:spPr>
           <a:xfrm>
-            <a:off x="521474" y="4116880"/>
+            <a:off x="1397402" y="4120508"/>
             <a:ext cx="8136904" cy="1938992"/>
           </a:xfrm>
           <a:prstGeom prst="rect">
@@ -6541,6 +6630,13 @@
   <p:clrMapOvr>
     <a:masterClrMapping/>
   </p:clrMapOvr>
+  <p:timing>
+    <p:tnLst>
+      <p:par>
+        <p:cTn id="1" dur="indefinite" restart="never" nodeType="tmRoot"/>
+      </p:par>
+    </p:tnLst>
+  </p:timing>
 </p:sld>
 </file>
 
@@ -6573,7 +6669,7 @@
         </p:nvSpPr>
         <p:spPr>
           <a:xfrm>
-            <a:off x="323528" y="0"/>
+            <a:off x="1847528" y="0"/>
             <a:ext cx="8229600" cy="1600200"/>
           </a:xfrm>
         </p:spPr>
@@ -6601,7 +6697,7 @@
         </p:nvSpPr>
         <p:spPr>
           <a:xfrm>
-            <a:off x="827584" y="1772816"/>
+            <a:off x="1415480" y="1772816"/>
             <a:ext cx="7632848" cy="3139321"/>
           </a:xfrm>
           <a:prstGeom prst="rect">
@@ -6625,23 +6721,8 @@
                 </a:solidFill>
                 <a:latin typeface="Arial" panose="020B0604020202020204" pitchFamily="34" charset="0"/>
               </a:rPr>
-              <a:t>Análise </a:t>
-            </a:r>
-            <a:r>
-              <a:rPr lang="pt-BR" sz="2400" b="1" dirty="0">
-                <a:solidFill>
-                  <a:schemeClr val="tx2"/>
-                </a:solidFill>
-                <a:latin typeface="Arial" panose="020B0604020202020204" pitchFamily="34" charset="0"/>
-              </a:rPr>
-              <a:t>Laboratorial</a:t>
-            </a:r>
-            <a:endParaRPr lang="pt-BR" sz="2400" b="1" dirty="0">
-              <a:solidFill>
-                <a:schemeClr val="tx2"/>
-              </a:solidFill>
-              <a:latin typeface="Arial" panose="020B0604020202020204" pitchFamily="34" charset="0"/>
-            </a:endParaRPr>
+              <a:t>Análise Laboratorial</a:t>
+            </a:r>
           </a:p>
           <a:p>
             <a:endParaRPr lang="pt-BR" sz="2000" dirty="0"/>
@@ -6652,21 +6733,21 @@
               <a:t>É um software de auxílio gerencial para Laboratórios de Análises Clínicas</a:t>
             </a:r>
             <a:r>
-              <a:rPr lang="pt-BR" sz="2200" dirty="0" smtClean="0"/>
+              <a:rPr lang="pt-BR" sz="2200" dirty="0"/>
               <a:t>.</a:t>
             </a:r>
             <a:r>
               <a:rPr lang="pt-BR" sz="2200" dirty="0"/>
               <a:t> </a:t>
             </a:r>
-            <a:endParaRPr lang="pt-BR" sz="2200" dirty="0" smtClean="0"/>
-          </a:p>
-          <a:p>
             <a:endParaRPr lang="pt-BR" sz="2200" dirty="0"/>
           </a:p>
           <a:p>
-            <a:r>
-              <a:rPr lang="pt-BR" sz="2200" dirty="0" smtClean="0"/>
+            <a:endParaRPr lang="pt-BR" sz="2200" dirty="0"/>
+          </a:p>
+          <a:p>
+            <a:r>
+              <a:rPr lang="pt-BR" sz="2200" dirty="0"/>
               <a:t>A </a:t>
             </a:r>
             <a:r>
@@ -6686,6 +6767,13 @@
   <p:clrMapOvr>
     <a:masterClrMapping/>
   </p:clrMapOvr>
+  <p:timing>
+    <p:tnLst>
+      <p:par>
+        <p:cTn id="1" dur="indefinite" restart="never" nodeType="tmRoot"/>
+      </p:par>
+    </p:tnLst>
+  </p:timing>
 </p:sld>
 </file>
 
@@ -6718,7 +6806,7 @@
         </p:nvSpPr>
         <p:spPr>
           <a:xfrm>
-            <a:off x="539552" y="2852936"/>
+            <a:off x="2063552" y="2852936"/>
             <a:ext cx="8229600" cy="1600200"/>
           </a:xfrm>
         </p:spPr>
@@ -6759,6 +6847,13 @@
   <p:clrMapOvr>
     <a:masterClrMapping/>
   </p:clrMapOvr>
+  <p:timing>
+    <p:tnLst>
+      <p:par>
+        <p:cTn id="1" dur="indefinite" restart="never" nodeType="tmRoot"/>
+      </p:par>
+    </p:tnLst>
+  </p:timing>
 </p:sld>
 </file>
 
@@ -6837,14 +6932,14 @@
           <a:p>
             <a:pPr lvl="1"/>
             <a:r>
-              <a:rPr lang="pt-BR" sz="2800" dirty="0" smtClean="0"/>
+              <a:rPr lang="pt-BR" sz="2800" dirty="0"/>
               <a:t>ProDoctor Software</a:t>
             </a:r>
           </a:p>
           <a:p>
             <a:pPr lvl="1"/>
             <a:r>
-              <a:rPr lang="pt-BR" sz="2800" dirty="0" smtClean="0"/>
+              <a:rPr lang="pt-BR" sz="2800" dirty="0"/>
               <a:t>HiDoctor Software Médico</a:t>
             </a:r>
             <a:endParaRPr lang="pt-BR" sz="2800" dirty="0"/>
@@ -6853,7 +6948,7 @@
             <a:pPr marL="457200" lvl="1" indent="0">
               <a:buNone/>
             </a:pPr>
-            <a:endParaRPr lang="pt-BR" sz="2800" dirty="0" smtClean="0"/>
+            <a:endParaRPr lang="pt-BR" sz="2800" dirty="0"/>
           </a:p>
           <a:p>
             <a:pPr marL="285750" indent="-285750"/>
@@ -6870,14 +6965,14 @@
           <a:p>
             <a:pPr lvl="1"/>
             <a:r>
-              <a:rPr lang="pt-BR" sz="2800" dirty="0" smtClean="0"/>
+              <a:rPr lang="pt-BR" sz="2800" dirty="0"/>
               <a:t>Mv Sistemas</a:t>
             </a:r>
           </a:p>
           <a:p>
             <a:pPr lvl="1"/>
             <a:r>
-              <a:rPr lang="pt-BR" sz="2800" dirty="0" smtClean="0"/>
+              <a:rPr lang="pt-BR" sz="2800" dirty="0"/>
               <a:t>Totvs Sistemas</a:t>
             </a:r>
           </a:p>
@@ -6893,6 +6988,13 @@
   <p:clrMapOvr>
     <a:masterClrMapping/>
   </p:clrMapOvr>
+  <p:timing>
+    <p:tnLst>
+      <p:par>
+        <p:cTn id="1" dur="indefinite" restart="never" nodeType="tmRoot"/>
+      </p:par>
+    </p:tnLst>
+  </p:timing>
 </p:sld>
 </file>
 
@@ -6925,7 +7027,7 @@
         </p:nvSpPr>
         <p:spPr>
           <a:xfrm>
-            <a:off x="539552" y="332656"/>
+            <a:off x="1775520" y="404664"/>
             <a:ext cx="8229600" cy="1600200"/>
           </a:xfrm>
         </p:spPr>
@@ -6953,6 +7055,86 @@
               <a:t> </a:t>
             </a:r>
             <a:endParaRPr lang="pt-BR" dirty="0"/>
+          </a:p>
+        </p:txBody>
+      </p:sp>
+      <p:sp>
+        <p:nvSpPr>
+          <p:cNvPr id="2" name="CaixaDeTexto 1"/>
+          <p:cNvSpPr txBox="1"/>
+          <p:nvPr/>
+        </p:nvSpPr>
+        <p:spPr>
+          <a:xfrm>
+            <a:off x="1343472" y="1772816"/>
+            <a:ext cx="9433048" cy="2246769"/>
+          </a:xfrm>
+          <a:prstGeom prst="rect">
+            <a:avLst/>
+          </a:prstGeom>
+          <a:noFill/>
+        </p:spPr>
+        <p:txBody>
+          <a:bodyPr wrap="square" rtlCol="0">
+            <a:spAutoFit/>
+          </a:bodyPr>
+          <a:lstStyle/>
+          <a:p>
+            <a:r>
+              <a:rPr lang="pt-BR" sz="2800" dirty="0"/>
+              <a:t>O </a:t>
+            </a:r>
+            <a:r>
+              <a:rPr lang="pt-BR" sz="2800" dirty="0"/>
+              <a:t>preço é baseado em quantidade de computadores, o mercado cobra entre 130 e 150 </a:t>
+            </a:r>
+            <a:r>
+              <a:rPr lang="pt-BR" sz="2800" b="1" dirty="0"/>
+              <a:t>por computador</a:t>
+            </a:r>
+            <a:r>
+              <a:rPr lang="pt-BR" sz="2800" b="1" dirty="0" smtClean="0"/>
+              <a:t>.</a:t>
+            </a:r>
+            <a:endParaRPr lang="pt-BR" sz="2800" b="1" dirty="0"/>
+          </a:p>
+          <a:p>
+            <a:r>
+              <a:rPr lang="pt-BR" sz="2800" dirty="0"/>
+              <a:t>Seguimos </a:t>
+            </a:r>
+            <a:r>
+              <a:rPr lang="pt-BR" sz="2800" dirty="0"/>
+              <a:t>os preços de mercado.</a:t>
+            </a:r>
+          </a:p>
+          <a:p>
+            <a:r>
+              <a:rPr lang="pt-BR" sz="2800" dirty="0"/>
+              <a:t>Há </a:t>
+            </a:r>
+            <a:r>
+              <a:rPr lang="pt-BR" sz="2800" dirty="0"/>
+              <a:t>empresas que cobram 20 por </a:t>
+            </a:r>
+            <a:r>
+              <a:rPr lang="pt-BR" sz="2800" dirty="0" smtClean="0"/>
+              <a:t>computador,</a:t>
+            </a:r>
+          </a:p>
+          <a:p>
+            <a:r>
+              <a:rPr lang="pt-BR" sz="2800" dirty="0" smtClean="0"/>
+              <a:t>nessas </a:t>
+            </a:r>
+            <a:r>
+              <a:rPr lang="pt-BR" sz="2800" dirty="0"/>
+              <a:t>os clientes ficam no máximo </a:t>
+            </a:r>
+            <a:r>
+              <a:rPr lang="pt-BR" sz="2800" b="1" dirty="0"/>
+              <a:t>18 meses.</a:t>
+            </a:r>
           </a:p>
         </p:txBody>
       </p:sp>
@@ -6966,6 +7148,13 @@
   <p:clrMapOvr>
     <a:masterClrMapping/>
   </p:clrMapOvr>
+  <p:timing>
+    <p:tnLst>
+      <p:par>
+        <p:cTn id="1" dur="indefinite" restart="never" nodeType="tmRoot"/>
+      </p:par>
+    </p:tnLst>
+  </p:timing>
 </p:sld>
 </file>
 
@@ -6998,8 +7187,8 @@
         </p:nvSpPr>
         <p:spPr>
           <a:xfrm>
-            <a:off x="539552" y="2852936"/>
-            <a:ext cx="8229600" cy="1600200"/>
+            <a:off x="839416" y="1340768"/>
+            <a:ext cx="10585176" cy="2320280"/>
           </a:xfrm>
         </p:spPr>
         <p:txBody>
@@ -7009,7 +7198,7 @@
           <a:lstStyle/>
           <a:p>
             <a:r>
-              <a:rPr lang="pt-BR" dirty="0" err="1" smtClean="0">
+              <a:rPr lang="pt-BR" sz="4400" dirty="0" err="1">
                 <a:solidFill>
                   <a:srgbClr val="FFC000"/>
                 </a:solidFill>
@@ -7017,12 +7206,35 @@
               <a:t>Pdu’S</a:t>
             </a:r>
             <a:r>
+              <a:rPr lang="pt-BR" sz="4400" dirty="0">
+                <a:solidFill>
+                  <a:srgbClr val="FFC000"/>
+                </a:solidFill>
+              </a:rPr>
+              <a:t/>
+            </a:r>
+            <a:br>
+              <a:rPr lang="pt-BR" sz="4400" dirty="0">
+                <a:solidFill>
+                  <a:srgbClr val="FFC000"/>
+                </a:solidFill>
+              </a:rPr>
+            </a:br>
+            <a:r>
+              <a:rPr lang="pt-BR" sz="4400" dirty="0">
+                <a:solidFill>
+                  <a:srgbClr val="FFC000"/>
+                </a:solidFill>
+              </a:rPr>
+              <a:t> </a:t>
+            </a:r>
+            <a:r>
               <a:rPr lang="pt-BR" dirty="0" smtClean="0">
                 <a:solidFill>
                   <a:srgbClr val="FFC000"/>
                 </a:solidFill>
               </a:rPr>
-              <a:t> </a:t>
+              <a:t/>
             </a:r>
             <a:br>
               <a:rPr lang="pt-BR" dirty="0" smtClean="0">
@@ -7048,20 +7260,8 @@
               <a:t>Profissional</a:t>
             </a:r>
             <a:r>
-              <a:rPr lang="pt-BR" dirty="0" smtClean="0"/>
+              <a:rPr lang="pt-BR" b="0" dirty="0" smtClean="0"/>
               <a:t>)</a:t>
-            </a:r>
-            <a:r>
-              <a:rPr lang="pt-BR" dirty="0" smtClean="0">
-                <a:solidFill>
-                  <a:srgbClr val="FFC000"/>
-                </a:solidFill>
-              </a:rPr>
-              <a:t> </a:t>
-            </a:r>
-            <a:r>
-              <a:rPr lang="pt-BR" dirty="0" smtClean="0"/>
-              <a:t>:</a:t>
             </a:r>
             <a:r>
               <a:rPr lang="pt-BR" dirty="0" smtClean="0">
@@ -7096,6 +7296,13 @@
   <p:clrMapOvr>
     <a:masterClrMapping/>
   </p:clrMapOvr>
+  <p:timing>
+    <p:tnLst>
+      <p:par>
+        <p:cTn id="1" dur="indefinite" restart="never" nodeType="tmRoot"/>
+      </p:par>
+    </p:tnLst>
+  </p:timing>
 </p:sld>
 </file>
 
@@ -7128,7 +7335,7 @@
         </p:nvSpPr>
         <p:spPr>
           <a:xfrm>
-            <a:off x="467544" y="116632"/>
+            <a:off x="1991544" y="116632"/>
             <a:ext cx="8229600" cy="764704"/>
           </a:xfrm>
         </p:spPr>
@@ -7155,7 +7362,7 @@
         </p:nvSpPr>
         <p:spPr>
           <a:xfrm>
-            <a:off x="467544" y="881336"/>
+            <a:off x="1991544" y="881336"/>
             <a:ext cx="8229600" cy="5616624"/>
           </a:xfrm>
         </p:spPr>
@@ -7166,7 +7373,7 @@
           <a:lstStyle/>
           <a:p>
             <a:r>
-              <a:rPr lang="pt-BR" sz="2800" dirty="0" smtClean="0">
+              <a:rPr lang="pt-BR" sz="2800" dirty="0">
                 <a:solidFill>
                   <a:srgbClr val="FFC000"/>
                 </a:solidFill>
@@ -7187,14 +7394,14 @@
               <a:t>Apresentação da </a:t>
             </a:r>
             <a:r>
-              <a:rPr lang="pt-BR" sz="2000" b="1" dirty="0" smtClean="0"/>
+              <a:rPr lang="pt-BR" sz="2000" b="1" dirty="0"/>
               <a:t>Empresa;</a:t>
             </a:r>
           </a:p>
           <a:p>
             <a:pPr lvl="1"/>
             <a:r>
-              <a:rPr lang="pt-BR" sz="2000" b="1" dirty="0" smtClean="0"/>
+              <a:rPr lang="pt-BR" sz="2000" b="1" dirty="0"/>
               <a:t>Sócios Fundadores;</a:t>
             </a:r>
             <a:endParaRPr lang="pt-BR" sz="2000" b="1" dirty="0"/>
@@ -7202,7 +7409,7 @@
           <a:p>
             <a:pPr lvl="1"/>
             <a:r>
-              <a:rPr lang="pt-BR" sz="2000" b="1" dirty="0" smtClean="0"/>
+              <a:rPr lang="pt-BR" sz="2000" b="1" dirty="0"/>
               <a:t>Segmento da Empresa;</a:t>
             </a:r>
             <a:endParaRPr lang="pt-BR" sz="2000" b="1" dirty="0"/>
@@ -7210,49 +7417,49 @@
           <a:p>
             <a:pPr lvl="1"/>
             <a:r>
-              <a:rPr lang="pt-BR" sz="2000" b="1" dirty="0" smtClean="0"/>
+              <a:rPr lang="pt-BR" sz="2000" b="1" dirty="0"/>
               <a:t>Marca que a ANS Explora;</a:t>
             </a:r>
           </a:p>
           <a:p>
             <a:pPr lvl="1"/>
             <a:r>
-              <a:rPr lang="pt-BR" sz="2000" b="1" dirty="0" smtClean="0"/>
+              <a:rPr lang="pt-BR" sz="2000" b="1" dirty="0"/>
               <a:t>Público-Alvo;</a:t>
             </a:r>
           </a:p>
           <a:p>
             <a:pPr lvl="1"/>
             <a:r>
-              <a:rPr lang="pt-BR" sz="2000" b="1" dirty="0" smtClean="0"/>
+              <a:rPr lang="pt-BR" sz="2000" b="1" dirty="0"/>
               <a:t>Produtos Mais Consumidos;</a:t>
             </a:r>
           </a:p>
           <a:p>
             <a:pPr lvl="1"/>
             <a:r>
-              <a:rPr lang="pt-BR" sz="2000" b="1" dirty="0" smtClean="0"/>
+              <a:rPr lang="pt-BR" sz="2000" b="1" dirty="0"/>
               <a:t>Concorrentes;</a:t>
             </a:r>
           </a:p>
           <a:p>
             <a:pPr lvl="1"/>
             <a:r>
-              <a:rPr lang="pt-BR" sz="2000" b="1" dirty="0" smtClean="0"/>
+              <a:rPr lang="pt-BR" sz="2000" b="1" dirty="0"/>
               <a:t>Política de Preços;</a:t>
             </a:r>
           </a:p>
           <a:p>
             <a:pPr lvl="1"/>
             <a:r>
-              <a:rPr lang="pt-BR" sz="2000" b="1" dirty="0" smtClean="0"/>
+              <a:rPr lang="pt-BR" sz="2000" b="1" dirty="0"/>
               <a:t>PDU’s;</a:t>
             </a:r>
           </a:p>
           <a:p>
             <a:pPr lvl="1"/>
             <a:r>
-              <a:rPr lang="pt-BR" sz="2000" b="1" dirty="0" smtClean="0"/>
+              <a:rPr lang="pt-BR" sz="2000" b="1" dirty="0"/>
               <a:t>Diferenciais Competitivos;</a:t>
             </a:r>
             <a:endParaRPr lang="pt-BR" sz="2000" b="1" dirty="0"/>
@@ -7308,18 +7515,18 @@
         </p:nvSpPr>
         <p:spPr>
           <a:xfrm>
-            <a:off x="395536" y="332656"/>
-            <a:ext cx="8229600" cy="1600200"/>
+            <a:off x="695400" y="332656"/>
+            <a:ext cx="10657184" cy="1600200"/>
           </a:xfrm>
         </p:spPr>
         <p:txBody>
           <a:bodyPr>
-            <a:normAutofit/>
+            <a:normAutofit fontScale="90000"/>
           </a:bodyPr>
           <a:lstStyle/>
           <a:p>
             <a:r>
-              <a:rPr lang="pt-BR" dirty="0" err="1" smtClean="0">
+              <a:rPr lang="pt-BR" sz="4400" dirty="0" err="1" smtClean="0">
                 <a:solidFill>
                   <a:srgbClr val="FFC000"/>
                 </a:solidFill>
@@ -7332,7 +7539,7 @@
                   <a:srgbClr val="FFC000"/>
                 </a:solidFill>
               </a:rPr>
-              <a:t> </a:t>
+              <a:t/>
             </a:r>
             <a:br>
               <a:rPr lang="pt-BR" dirty="0" smtClean="0">
@@ -7342,7 +7549,22 @@
               </a:rPr>
             </a:br>
             <a:r>
-              <a:rPr lang="pt-BR" dirty="0" smtClean="0"/>
+              <a:rPr lang="pt-BR" dirty="0" smtClean="0">
+                <a:solidFill>
+                  <a:srgbClr val="FFC000"/>
+                </a:solidFill>
+              </a:rPr>
+              <a:t/>
+            </a:r>
+            <a:br>
+              <a:rPr lang="pt-BR" dirty="0" smtClean="0">
+                <a:solidFill>
+                  <a:srgbClr val="FFC000"/>
+                </a:solidFill>
+              </a:rPr>
+            </a:br>
+            <a:r>
+              <a:rPr lang="pt-BR" b="0" dirty="0" smtClean="0"/>
               <a:t>(</a:t>
             </a:r>
             <a:r>
@@ -7358,10 +7580,10 @@
               <a:t>Profissional</a:t>
             </a:r>
             <a:r>
-              <a:rPr lang="pt-BR" dirty="0" smtClean="0"/>
+              <a:rPr lang="pt-BR" b="0" dirty="0" smtClean="0"/>
               <a:t>)</a:t>
             </a:r>
-            <a:endParaRPr lang="pt-BR" dirty="0"/>
+            <a:endParaRPr lang="pt-BR" b="0" dirty="0"/>
           </a:p>
         </p:txBody>
       </p:sp>
@@ -7375,6 +7597,13 @@
   <p:clrMapOvr>
     <a:masterClrMapping/>
   </p:clrMapOvr>
+  <p:timing>
+    <p:tnLst>
+      <p:par>
+        <p:cTn id="1" dur="indefinite" restart="never" nodeType="tmRoot"/>
+      </p:par>
+    </p:tnLst>
+  </p:timing>
 </p:sld>
 </file>
 
@@ -7407,7 +7636,7 @@
         </p:nvSpPr>
         <p:spPr>
           <a:xfrm>
-            <a:off x="539552" y="2852936"/>
+            <a:off x="2063552" y="2852936"/>
             <a:ext cx="8229600" cy="1600200"/>
           </a:xfrm>
         </p:spPr>
@@ -7480,7 +7709,7 @@
         </p:nvSpPr>
         <p:spPr>
           <a:xfrm>
-            <a:off x="467544" y="332656"/>
+            <a:off x="1991544" y="332656"/>
             <a:ext cx="8229600" cy="1600200"/>
           </a:xfrm>
         </p:spPr>
@@ -7491,7 +7720,7 @@
           <a:lstStyle/>
           <a:p>
             <a:r>
-              <a:rPr lang="pt-BR" sz="3200" dirty="0" smtClean="0">
+              <a:rPr lang="pt-BR" sz="3200" dirty="0">
                 <a:solidFill>
                   <a:srgbClr val="FFC000"/>
                 </a:solidFill>
@@ -7499,7 +7728,7 @@
               <a:t>DIFERENCIAIS</a:t>
             </a:r>
             <a:r>
-              <a:rPr lang="pt-BR" sz="3600" dirty="0" smtClean="0">
+              <a:rPr lang="pt-BR" sz="3600" dirty="0">
                 <a:solidFill>
                   <a:srgbClr val="FFC000"/>
                 </a:solidFill>
@@ -7507,7 +7736,7 @@
               <a:t> </a:t>
             </a:r>
             <a:r>
-              <a:rPr lang="pt-BR" sz="3200" dirty="0" smtClean="0">
+              <a:rPr lang="pt-BR" sz="3200" dirty="0">
                 <a:solidFill>
                   <a:srgbClr val="FFC000"/>
                 </a:solidFill>
@@ -7526,8 +7755,8 @@
         </p:nvSpPr>
         <p:spPr>
           <a:xfrm>
-            <a:off x="899592" y="1988840"/>
-            <a:ext cx="7632848" cy="3539430"/>
+            <a:off x="1271464" y="1932856"/>
+            <a:ext cx="9505056" cy="3108543"/>
           </a:xfrm>
           <a:prstGeom prst="rect">
             <a:avLst/>
@@ -7539,78 +7768,72 @@
           </a:bodyPr>
           <a:lstStyle/>
           <a:p>
-            <a:pPr marL="457200" indent="-457200" algn="just">
+            <a:pPr marL="457200" indent="-457200">
               <a:buFont typeface="Arial" pitchFamily="34" charset="0"/>
               <a:buChar char="•"/>
             </a:pPr>
             <a:r>
-              <a:rPr lang="pt-BR" sz="2800" b="1" dirty="0" smtClean="0">
+              <a:rPr lang="pt-BR" sz="2800" b="1" dirty="0">
                 <a:latin typeface="Arial" panose="020B0604020202020204" pitchFamily="34" charset="0"/>
               </a:rPr>
               <a:t>Preço abaixo do mercado;</a:t>
             </a:r>
           </a:p>
           <a:p>
-            <a:pPr marL="457200" indent="-457200" algn="just">
+            <a:pPr marL="457200" indent="-457200">
               <a:buFont typeface="Arial" pitchFamily="34" charset="0"/>
               <a:buChar char="•"/>
             </a:pPr>
             <a:r>
-              <a:rPr lang="pt-BR" sz="2800" b="1" dirty="0" smtClean="0">
+              <a:rPr lang="pt-BR" sz="2800" b="1" dirty="0">
                 <a:latin typeface="Arial" panose="020B0604020202020204" pitchFamily="34" charset="0"/>
               </a:rPr>
               <a:t>Customizações ilimitadas*;</a:t>
             </a:r>
           </a:p>
           <a:p>
-            <a:pPr marL="457200" indent="-457200" algn="just">
+            <a:pPr marL="457200" indent="-457200">
               <a:buFont typeface="Arial" pitchFamily="34" charset="0"/>
               <a:buChar char="•"/>
             </a:pPr>
             <a:r>
-              <a:rPr lang="pt-BR" sz="2800" b="1" dirty="0" smtClean="0">
-                <a:latin typeface="Arial" panose="020B0604020202020204" pitchFamily="34" charset="0"/>
-              </a:rPr>
-              <a:t>Preocupação</a:t>
-            </a:r>
-            <a:r>
-              <a:rPr lang="pt-BR" sz="2800" b="1" dirty="0" smtClean="0">
-                <a:latin typeface="Arial" panose="020B0604020202020204" pitchFamily="34" charset="0"/>
-              </a:rPr>
-              <a:t> </a:t>
-            </a:r>
-            <a:r>
               <a:rPr lang="pt-BR" sz="2800" b="1" dirty="0">
                 <a:latin typeface="Arial" panose="020B0604020202020204" pitchFamily="34" charset="0"/>
               </a:rPr>
-              <a:t>com a conservação do meio ambiente. </a:t>
-            </a:r>
-            <a:r>
-              <a:rPr lang="pt-BR" sz="2800" b="1" dirty="0" smtClean="0">
-                <a:latin typeface="Arial" panose="020B0604020202020204" pitchFamily="34" charset="0"/>
-              </a:rPr>
-              <a:t>Seu sistema auxilia </a:t>
+              <a:t>Preocupação </a:t>
             </a:r>
             <a:r>
               <a:rPr lang="pt-BR" sz="2800" b="1" dirty="0">
                 <a:latin typeface="Arial" panose="020B0604020202020204" pitchFamily="34" charset="0"/>
               </a:rPr>
-              <a:t>na redução do manejo e impressão de papeis em até 90% e no aumento do controle das atividades administrativas e </a:t>
-            </a:r>
-            <a:r>
-              <a:rPr lang="pt-BR" sz="2800" b="1" dirty="0" smtClean="0">
-                <a:latin typeface="Arial" panose="020B0604020202020204" pitchFamily="34" charset="0"/>
-              </a:rPr>
-              <a:t>financeiras </a:t>
+              <a:t>com a conservação do meio ambiente. </a:t>
             </a:r>
             <a:r>
               <a:rPr lang="pt-BR" sz="2800" b="1" dirty="0">
                 <a:latin typeface="Arial" panose="020B0604020202020204" pitchFamily="34" charset="0"/>
               </a:rPr>
+              <a:t>Seu sistema auxilia </a:t>
+            </a:r>
+            <a:r>
+              <a:rPr lang="pt-BR" sz="2800" b="1" dirty="0">
+                <a:latin typeface="Arial" panose="020B0604020202020204" pitchFamily="34" charset="0"/>
+              </a:rPr>
+              <a:t>na redução do manejo e impressão de papeis em até 90% e no aumento do controle das atividades administrativas e </a:t>
+            </a:r>
+            <a:r>
+              <a:rPr lang="pt-BR" sz="2800" b="1" dirty="0">
+                <a:latin typeface="Arial" panose="020B0604020202020204" pitchFamily="34" charset="0"/>
+              </a:rPr>
+              <a:t>financeiras </a:t>
+            </a:r>
+            <a:r>
+              <a:rPr lang="pt-BR" sz="2800" b="1" dirty="0">
+                <a:latin typeface="Arial" panose="020B0604020202020204" pitchFamily="34" charset="0"/>
+              </a:rPr>
               <a:t>de </a:t>
             </a:r>
             <a:r>
-              <a:rPr lang="pt-BR" sz="2800" b="1" dirty="0" smtClean="0">
+              <a:rPr lang="pt-BR" sz="2800" b="1" dirty="0">
                 <a:latin typeface="Arial" panose="020B0604020202020204" pitchFamily="34" charset="0"/>
               </a:rPr>
               <a:t>seus clientes.</a:t>
@@ -7629,7 +7852,7 @@
         </p:nvSpPr>
         <p:spPr>
           <a:xfrm>
-            <a:off x="1331640" y="6070038"/>
+            <a:off x="2711624" y="5589240"/>
             <a:ext cx="6768752" cy="584775"/>
           </a:xfrm>
           <a:prstGeom prst="rect">
@@ -7644,7 +7867,7 @@
           <a:lstStyle/>
           <a:p>
             <a:r>
-              <a:rPr lang="pt-BR" sz="1600" dirty="0" smtClean="0"/>
+              <a:rPr lang="pt-BR" sz="1600" dirty="0"/>
               <a:t>*As solicitações de customização passam por uma análise, caso seja aprovada, será entregue dentro de um prazo de até quatro meses.</a:t>
             </a:r>
             <a:endParaRPr lang="pt-BR" sz="1600" dirty="0"/>
@@ -7735,7 +7958,7 @@
         </p:blipFill>
         <p:spPr>
           <a:xfrm>
-            <a:off x="2720157" y="1772816"/>
+            <a:off x="4244157" y="1772816"/>
             <a:ext cx="3695700" cy="3695700"/>
           </a:xfrm>
         </p:spPr>
@@ -7812,7 +8035,7 @@
         </p:nvSpPr>
         <p:spPr>
           <a:xfrm>
-            <a:off x="685346" y="2492896"/>
+            <a:off x="2209346" y="2492896"/>
             <a:ext cx="7765322" cy="3695136"/>
           </a:xfrm>
         </p:spPr>
@@ -7824,25 +8047,21 @@
           <a:p>
             <a:pPr lvl="1" algn="just"/>
             <a:r>
-              <a:rPr lang="pt-BR" sz="2400" dirty="0" smtClean="0">
-                <a:solidFill>
-                  <a:schemeClr val="tx1"/>
-                </a:solidFill>
-              </a:rPr>
+              <a:rPr lang="pt-BR" sz="2400" dirty="0"/>
               <a:t>ANS SISTEMAS</a:t>
             </a:r>
             <a:r>
               <a:rPr lang="pt-BR" sz="2400" dirty="0"/>
               <a:t>: </a:t>
             </a:r>
-            <a:endParaRPr lang="pt-BR" sz="2400" dirty="0" smtClean="0"/>
+            <a:endParaRPr lang="pt-BR" sz="2400" dirty="0"/>
           </a:p>
           <a:p>
             <a:pPr marL="457200" lvl="1" indent="0" algn="just">
               <a:buNone/>
             </a:pPr>
             <a:r>
-              <a:rPr lang="pt-BR" sz="2400" u="sng" dirty="0" smtClean="0">
+              <a:rPr lang="pt-BR" sz="2400" u="sng" dirty="0">
                 <a:solidFill>
                   <a:srgbClr val="FFC000"/>
                 </a:solidFill>
@@ -7858,23 +8077,14 @@
               <a:t>://www.analisesistemas.com/index.php</a:t>
             </a:r>
             <a:r>
-              <a:rPr lang="pt-BR" sz="2400" dirty="0" smtClean="0"/>
+              <a:rPr lang="pt-BR" sz="2400" dirty="0"/>
               <a:t>;</a:t>
             </a:r>
-            <a:endParaRPr lang="pt-BR" sz="2400" dirty="0">
-              <a:solidFill>
-                <a:schemeClr val="tx1"/>
-              </a:solidFill>
-            </a:endParaRPr>
+            <a:endParaRPr lang="pt-BR" sz="2400" dirty="0"/>
           </a:p>
           <a:p>
             <a:pPr algn="just"/>
-            <a:endParaRPr lang="pt-BR" sz="2800" dirty="0">
-              <a:solidFill>
-                <a:schemeClr val="tx1"/>
-              </a:solidFill>
-              <a:latin typeface="+mn-lt"/>
-            </a:endParaRPr>
+            <a:endParaRPr lang="pt-BR" sz="2800" dirty="0"/>
           </a:p>
         </p:txBody>
       </p:sp>
@@ -7927,7 +8137,7 @@
         </p:nvSpPr>
         <p:spPr>
           <a:xfrm>
-            <a:off x="539552" y="2852936"/>
+            <a:off x="2063552" y="2852936"/>
             <a:ext cx="8229600" cy="1600200"/>
           </a:xfrm>
         </p:spPr>
@@ -7942,14 +8152,6 @@
                 </a:solidFill>
               </a:rPr>
               <a:t>Apresentação da empresa:</a:t>
-            </a:r>
-            <a:r>
-              <a:rPr lang="pt-BR" dirty="0" smtClean="0">
-                <a:solidFill>
-                  <a:srgbClr val="FFC000"/>
-                </a:solidFill>
-              </a:rPr>
-              <a:t/>
             </a:r>
             <a:br>
               <a:rPr lang="pt-BR" dirty="0" smtClean="0">
@@ -7976,6 +8178,13 @@
   <p:clrMapOvr>
     <a:masterClrMapping/>
   </p:clrMapOvr>
+  <p:timing>
+    <p:tnLst>
+      <p:par>
+        <p:cTn id="1" dur="indefinite" restart="never" nodeType="tmRoot"/>
+      </p:par>
+    </p:tnLst>
+  </p:timing>
 </p:sld>
 </file>
 
@@ -8039,7 +8248,7 @@
         </p:nvSpPr>
         <p:spPr>
           <a:xfrm>
-            <a:off x="685346" y="1772816"/>
+            <a:off x="2209346" y="1772816"/>
             <a:ext cx="7765322" cy="3695136"/>
           </a:xfrm>
         </p:spPr>
@@ -8068,6 +8277,13 @@
   <p:clrMapOvr>
     <a:masterClrMapping/>
   </p:clrMapOvr>
+  <p:timing>
+    <p:tnLst>
+      <p:par>
+        <p:cTn id="1" dur="indefinite" restart="never" nodeType="tmRoot"/>
+      </p:par>
+    </p:tnLst>
+  </p:timing>
 </p:sld>
 </file>
 
@@ -8100,7 +8316,7 @@
         </p:nvSpPr>
         <p:spPr>
           <a:xfrm>
-            <a:off x="539552" y="2852936"/>
+            <a:off x="2063552" y="2852936"/>
             <a:ext cx="8229600" cy="1600200"/>
           </a:xfrm>
         </p:spPr>
@@ -8115,14 +8331,6 @@
                 </a:solidFill>
               </a:rPr>
               <a:t>Sócios fundadores:</a:t>
-            </a:r>
-            <a:r>
-              <a:rPr lang="pt-BR" dirty="0" smtClean="0">
-                <a:solidFill>
-                  <a:srgbClr val="FFC000"/>
-                </a:solidFill>
-              </a:rPr>
-              <a:t/>
             </a:r>
             <a:br>
               <a:rPr lang="pt-BR" dirty="0" smtClean="0">
@@ -8149,6 +8357,13 @@
   <p:clrMapOvr>
     <a:masterClrMapping/>
   </p:clrMapOvr>
+  <p:timing>
+    <p:tnLst>
+      <p:par>
+        <p:cTn id="1" dur="indefinite" restart="never" nodeType="tmRoot"/>
+      </p:par>
+    </p:tnLst>
+  </p:timing>
 </p:sld>
 </file>
 
@@ -8208,7 +8423,7 @@
         </p:nvSpPr>
         <p:spPr>
           <a:xfrm>
-            <a:off x="904321" y="1700808"/>
+            <a:off x="1991544" y="1700808"/>
             <a:ext cx="7343038" cy="1656184"/>
           </a:xfrm>
         </p:spPr>
@@ -8219,25 +8434,25 @@
           <a:lstStyle/>
           <a:p>
             <a:r>
-              <a:rPr lang="pt-BR" sz="3200" b="1" dirty="0" smtClean="0"/>
+              <a:rPr lang="pt-BR" sz="3200" b="1" dirty="0"/>
               <a:t>Saulo Alencar	</a:t>
             </a:r>
           </a:p>
           <a:p>
             <a:r>
-              <a:rPr lang="pt-BR" sz="3200" b="1" dirty="0" smtClean="0"/>
+              <a:rPr lang="pt-BR" sz="3200" b="1" dirty="0"/>
               <a:t>Alan Campos</a:t>
             </a:r>
           </a:p>
           <a:p>
             <a:r>
-              <a:rPr lang="pt-BR" sz="3200" b="1" dirty="0" smtClean="0"/>
+              <a:rPr lang="pt-BR" sz="3200" b="1" dirty="0"/>
               <a:t>Clovis Campos</a:t>
             </a:r>
           </a:p>
           <a:p>
             <a:pPr marL="285750" indent="-285750"/>
-            <a:endParaRPr lang="pt-BR" sz="3200" b="1" dirty="0" smtClean="0"/>
+            <a:endParaRPr lang="pt-BR" sz="3200" b="1" dirty="0"/>
           </a:p>
           <a:p>
             <a:pPr marL="285750" indent="-285750"/>
@@ -8257,7 +8472,7 @@
         </p:nvSpPr>
         <p:spPr>
           <a:xfrm>
-            <a:off x="403216" y="3459719"/>
+            <a:off x="1490439" y="3459720"/>
             <a:ext cx="8345248" cy="2800767"/>
           </a:xfrm>
           <a:prstGeom prst="rect">
@@ -8273,7 +8488,7 @@
           <a:p>
             <a:pPr algn="just"/>
             <a:r>
-              <a:rPr lang="pt-BR" sz="2200" dirty="0" smtClean="0"/>
+              <a:rPr lang="pt-BR" sz="2200" dirty="0"/>
               <a:t>O sistema foi inicialmente desenvolvido por Alan Campos e Clovis Campos, ao qual conseguiram desenvolver uma base para o sistema ANS e conseguir o primeiro cliente. Nessa mesma época Alan também trabalhava em uma empresa chamada “Informata”, ao qual Saulo começou a estagiar e conheçeu Alan,  após tomar conheçimento sobre o sistema, Saulo investiu na empresa entrando como sócio e posteriormente Clovis vende a parte dele para Saulo e Alan.</a:t>
             </a:r>
             <a:endParaRPr lang="pt-BR" sz="2200" dirty="0"/>
@@ -8290,6 +8505,13 @@
   <p:clrMapOvr>
     <a:masterClrMapping/>
   </p:clrMapOvr>
+  <p:timing>
+    <p:tnLst>
+      <p:par>
+        <p:cTn id="1" dur="indefinite" restart="never" nodeType="tmRoot"/>
+      </p:par>
+    </p:tnLst>
+  </p:timing>
 </p:sld>
 </file>
 
@@ -8322,7 +8544,7 @@
         </p:nvSpPr>
         <p:spPr>
           <a:xfrm>
-            <a:off x="539552" y="2852936"/>
+            <a:off x="2063552" y="2852936"/>
             <a:ext cx="8229600" cy="1600200"/>
           </a:xfrm>
         </p:spPr>
@@ -8337,14 +8559,6 @@
                 </a:solidFill>
               </a:rPr>
               <a:t>Segmento da empresa:</a:t>
-            </a:r>
-            <a:r>
-              <a:rPr lang="pt-BR" dirty="0" smtClean="0">
-                <a:solidFill>
-                  <a:srgbClr val="FFC000"/>
-                </a:solidFill>
-              </a:rPr>
-              <a:t/>
             </a:r>
             <a:br>
               <a:rPr lang="pt-BR" dirty="0" smtClean="0">
@@ -8371,6 +8585,13 @@
   <p:clrMapOvr>
     <a:masterClrMapping/>
   </p:clrMapOvr>
+  <p:timing>
+    <p:tnLst>
+      <p:par>
+        <p:cTn id="1" dur="indefinite" restart="never" nodeType="tmRoot"/>
+      </p:par>
+    </p:tnLst>
+  </p:timing>
 </p:sld>
 </file>
 
@@ -8435,7 +8656,7 @@
         </p:nvSpPr>
         <p:spPr>
           <a:xfrm>
-            <a:off x="899592" y="2060848"/>
+            <a:off x="1559496" y="2132856"/>
             <a:ext cx="7343038" cy="3695136"/>
           </a:xfrm>
         </p:spPr>
@@ -8453,22 +8674,13 @@
                 </a:solidFill>
                 <a:latin typeface="Arial" panose="020B0604020202020204" pitchFamily="34" charset="0"/>
               </a:rPr>
-              <a:t>Prestação de serviços</a:t>
-            </a:r>
-            <a:r>
-              <a:rPr lang="pt-BR" sz="3200" b="1" dirty="0">
-                <a:solidFill>
-                  <a:schemeClr val="tx2"/>
-                </a:solidFill>
-                <a:latin typeface="Arial" panose="020B0604020202020204" pitchFamily="34" charset="0"/>
-              </a:rPr>
-              <a:t>:</a:t>
+              <a:t>Prestação de serviços:</a:t>
             </a:r>
           </a:p>
           <a:p>
             <a:pPr lvl="1" algn="just"/>
             <a:r>
-              <a:rPr lang="pt-BR" sz="3200" dirty="0" smtClean="0"/>
+              <a:rPr lang="pt-BR" sz="3200" dirty="0"/>
               <a:t>Área de Saúde. </a:t>
             </a:r>
             <a:endParaRPr lang="pt-BR" sz="3200" dirty="0"/>
@@ -8485,6 +8697,13 @@
   <p:clrMapOvr>
     <a:overrideClrMapping bg1="dk1" tx1="lt1" bg2="dk2" tx2="lt2" accent1="accent1" accent2="accent2" accent3="accent3" accent4="accent4" accent5="accent5" accent6="accent6" hlink="hlink" folHlink="folHlink"/>
   </p:clrMapOvr>
+  <p:timing>
+    <p:tnLst>
+      <p:par>
+        <p:cTn id="1" dur="indefinite" restart="never" nodeType="tmRoot"/>
+      </p:par>
+    </p:tnLst>
+  </p:timing>
 </p:sld>
 </file>
 
@@ -8517,8 +8736,8 @@
         </p:nvSpPr>
         <p:spPr>
           <a:xfrm>
-            <a:off x="539552" y="2852936"/>
-            <a:ext cx="8229600" cy="1600200"/>
+            <a:off x="1343472" y="2852936"/>
+            <a:ext cx="9505056" cy="1600200"/>
           </a:xfrm>
         </p:spPr>
         <p:txBody>
@@ -8531,7 +8750,23 @@
                   <a:srgbClr val="FFC000"/>
                 </a:solidFill>
               </a:rPr>
-              <a:t>Marca que a empresa explora:</a:t>
+              <a:t>Marca que a </a:t>
+            </a:r>
+            <a:r>
+              <a:rPr lang="pt-BR" dirty="0" smtClean="0">
+                <a:solidFill>
+                  <a:srgbClr val="FFC000"/>
+                </a:solidFill>
+              </a:rPr>
+              <a:t>empresa explora</a:t>
+            </a:r>
+            <a:r>
+              <a:rPr lang="pt-BR" dirty="0" smtClean="0">
+                <a:solidFill>
+                  <a:srgbClr val="FFC000"/>
+                </a:solidFill>
+              </a:rPr>
+              <a:t>:</a:t>
             </a:r>
             <a:br>
               <a:rPr lang="pt-BR" dirty="0" smtClean="0">
@@ -8558,6 +8793,13 @@
   <p:clrMapOvr>
     <a:masterClrMapping/>
   </p:clrMapOvr>
+  <p:timing>
+    <p:tnLst>
+      <p:par>
+        <p:cTn id="1" dur="indefinite" restart="never" nodeType="tmRoot"/>
+      </p:par>
+    </p:tnLst>
+  </p:timing>
 </p:sld>
 </file>
 
@@ -8811,7 +9053,7 @@
   <a:extraClrSchemeLst/>
   <a:extLst>
     <a:ext uri="{05A4C25C-085E-4340-85A3-A5531E510DB2}">
-      <thm15:themeFamily xmlns:thm15="http://schemas.microsoft.com/office/thememl/2012/main" xmlns="" name="Damask" id="{F9A299A0-33D0-4E0F-9F3F-7163E3744208}" vid="{746EEEEA-FB6A-406B-B510-531588D54811}"/>
+      <thm15:themeFamily xmlns:thm15="http://schemas.microsoft.com/office/thememl/2012/main" name="Damask" id="{F9A299A0-33D0-4E0F-9F3F-7163E3744208}" vid="{746EEEEA-FB6A-406B-B510-531588D54811}"/>
     </a:ext>
   </a:extLst>
 </a:theme>

</xml_diff>